<commit_message>
Zmodyfikowano prezentację na temat globalności i lokalności
</commit_message>
<xml_diff>
--- a/Wprowadzenie do funkcji/III. Wprowadzenie do funkcji - globalność i lokalność zmiennych/Globalność i lokalność.pptx
+++ b/Wprowadzenie do funkcji/III. Wprowadzenie do funkcji - globalność i lokalność zmiennych/Globalność i lokalność.pptx
@@ -9,13 +9,16 @@
     <p:sldId id="260" r:id="rId3"/>
     <p:sldId id="261" r:id="rId4"/>
     <p:sldId id="262" r:id="rId5"/>
-    <p:sldId id="263" r:id="rId6"/>
-    <p:sldId id="264" r:id="rId7"/>
-    <p:sldId id="268" r:id="rId8"/>
-    <p:sldId id="269" r:id="rId9"/>
-    <p:sldId id="270" r:id="rId10"/>
-    <p:sldId id="271" r:id="rId11"/>
-    <p:sldId id="267" r:id="rId12"/>
+    <p:sldId id="272" r:id="rId6"/>
+    <p:sldId id="273" r:id="rId7"/>
+    <p:sldId id="274" r:id="rId8"/>
+    <p:sldId id="275" r:id="rId9"/>
+    <p:sldId id="264" r:id="rId10"/>
+    <p:sldId id="268" r:id="rId11"/>
+    <p:sldId id="269" r:id="rId12"/>
+    <p:sldId id="270" r:id="rId13"/>
+    <p:sldId id="271" r:id="rId14"/>
+    <p:sldId id="267" r:id="rId15"/>
   </p:sldIdLst>
   <p:sldSz cx="12192000" cy="6858000"/>
   <p:notesSz cx="6858000" cy="9144000"/>
@@ -30160,6 +30163,1086 @@
           <p:cNvPr id="2" name="Tytuł 1">
             <a:extLst>
               <a:ext uri="{FF2B5EF4-FFF2-40B4-BE49-F238E27FC236}">
+                <a16:creationId xmlns:a16="http://schemas.microsoft.com/office/drawing/2014/main" id="{ABC53672-EF4B-4831-9E38-12951B158619}"/>
+              </a:ext>
+            </a:extLst>
+          </p:cNvPr>
+          <p:cNvSpPr>
+            <a:spLocks noGrp="1"/>
+          </p:cNvSpPr>
+          <p:nvPr>
+            <p:ph type="title"/>
+          </p:nvPr>
+        </p:nvSpPr>
+        <p:spPr/>
+        <p:txBody>
+          <a:bodyPr/>
+          <a:lstStyle/>
+          <a:p>
+            <a:r>
+              <a:rPr lang="pl-PL" dirty="0"/>
+              <a:t>Przykład</a:t>
+            </a:r>
+          </a:p>
+        </p:txBody>
+      </p:sp>
+      <p:grpSp>
+        <p:nvGrpSpPr>
+          <p:cNvPr id="8" name="Grupa 7">
+            <a:extLst>
+              <a:ext uri="{FF2B5EF4-FFF2-40B4-BE49-F238E27FC236}">
+                <a16:creationId xmlns:a16="http://schemas.microsoft.com/office/drawing/2014/main" id="{91FDE43D-B8A5-4B93-9EE3-2ED73D1D903B}"/>
+              </a:ext>
+            </a:extLst>
+          </p:cNvPr>
+          <p:cNvGrpSpPr/>
+          <p:nvPr/>
+        </p:nvGrpSpPr>
+        <p:grpSpPr>
+          <a:xfrm>
+            <a:off x="0" y="1892182"/>
+            <a:ext cx="6316070" cy="3429922"/>
+            <a:chOff x="0" y="1892182"/>
+            <a:chExt cx="6316070" cy="3429922"/>
+          </a:xfrm>
+        </p:grpSpPr>
+        <p:graphicFrame>
+          <p:nvGraphicFramePr>
+            <p:cNvPr id="4" name="Diagram 3">
+              <a:extLst>
+                <a:ext uri="{FF2B5EF4-FFF2-40B4-BE49-F238E27FC236}">
+                  <a16:creationId xmlns:a16="http://schemas.microsoft.com/office/drawing/2014/main" id="{04D11AEF-FB9A-4BD3-ABC4-0314E8D30E30}"/>
+                </a:ext>
+              </a:extLst>
+            </p:cNvPr>
+            <p:cNvGraphicFramePr/>
+            <p:nvPr>
+              <p:extLst>
+                <p:ext uri="{D42A27DB-BD31-4B8C-83A1-F6EECF244321}">
+                  <p14:modId xmlns:p14="http://schemas.microsoft.com/office/powerpoint/2010/main" val="3781479862"/>
+                </p:ext>
+              </p:extLst>
+            </p:nvPr>
+          </p:nvGraphicFramePr>
+          <p:xfrm>
+            <a:off x="0" y="1892182"/>
+            <a:ext cx="6316070" cy="3429922"/>
+          </p:xfrm>
+          <a:graphic>
+            <a:graphicData uri="http://schemas.openxmlformats.org/drawingml/2006/diagram">
+              <dgm:relIds xmlns:dgm="http://schemas.openxmlformats.org/drawingml/2006/diagram" xmlns:r="http://schemas.openxmlformats.org/officeDocument/2006/relationships" r:dm="rId2" r:lo="rId3" r:qs="rId4" r:cs="rId5"/>
+            </a:graphicData>
+          </a:graphic>
+        </p:graphicFrame>
+        <p:pic>
+          <p:nvPicPr>
+            <p:cNvPr id="5" name="Obraz 4" descr="Obraz zawierający tekst, znak&#10;&#10;Opis wygenerowany przy wysokim poziomie pewności">
+              <a:extLst>
+                <a:ext uri="{FF2B5EF4-FFF2-40B4-BE49-F238E27FC236}">
+                  <a16:creationId xmlns:a16="http://schemas.microsoft.com/office/drawing/2014/main" id="{8475C1EA-C10C-46AC-B2ED-21E16000A1ED}"/>
+                </a:ext>
+              </a:extLst>
+            </p:cNvPr>
+            <p:cNvPicPr>
+              <a:picLocks noChangeAspect="1"/>
+            </p:cNvPicPr>
+            <p:nvPr/>
+          </p:nvPicPr>
+          <p:blipFill>
+            <a:blip r:embed="rId7">
+              <a:extLst>
+                <a:ext uri="{837473B0-CC2E-450A-ABE3-18F120FF3D39}">
+                  <a1611:picAttrSrcUrl xmlns:a1611="http://schemas.microsoft.com/office/drawing/2016/11/main" r:id="rId8"/>
+                </a:ext>
+              </a:extLst>
+            </a:blip>
+            <a:stretch>
+              <a:fillRect/>
+            </a:stretch>
+          </p:blipFill>
+          <p:spPr>
+            <a:xfrm>
+              <a:off x="1997397" y="3762595"/>
+              <a:ext cx="376272" cy="376272"/>
+            </a:xfrm>
+            <a:prstGeom prst="rect">
+              <a:avLst/>
+            </a:prstGeom>
+          </p:spPr>
+        </p:pic>
+        <p:pic>
+          <p:nvPicPr>
+            <p:cNvPr id="6" name="Obraz 5">
+              <a:extLst>
+                <a:ext uri="{FF2B5EF4-FFF2-40B4-BE49-F238E27FC236}">
+                  <a16:creationId xmlns:a16="http://schemas.microsoft.com/office/drawing/2014/main" id="{67DD1412-5BB4-413D-B915-E4F0F76688DC}"/>
+                </a:ext>
+              </a:extLst>
+            </p:cNvPr>
+            <p:cNvPicPr>
+              <a:picLocks noChangeAspect="1"/>
+            </p:cNvPicPr>
+            <p:nvPr/>
+          </p:nvPicPr>
+          <p:blipFill>
+            <a:blip r:embed="rId9">
+              <a:extLst>
+                <a:ext uri="{837473B0-CC2E-450A-ABE3-18F120FF3D39}">
+                  <a1611:picAttrSrcUrl xmlns:a1611="http://schemas.microsoft.com/office/drawing/2016/11/main" r:id="rId10"/>
+                </a:ext>
+              </a:extLst>
+            </a:blip>
+            <a:stretch>
+              <a:fillRect/>
+            </a:stretch>
+          </p:blipFill>
+          <p:spPr>
+            <a:xfrm>
+              <a:off x="1966412" y="4152225"/>
+              <a:ext cx="438242" cy="438242"/>
+            </a:xfrm>
+            <a:prstGeom prst="rect">
+              <a:avLst/>
+            </a:prstGeom>
+          </p:spPr>
+        </p:pic>
+        <p:pic>
+          <p:nvPicPr>
+            <p:cNvPr id="7" name="Obraz 6" descr="Obraz zawierający niebo, zewnętrzne&#10;&#10;Opis wygenerowany przy wysokim poziomie pewności">
+              <a:extLst>
+                <a:ext uri="{FF2B5EF4-FFF2-40B4-BE49-F238E27FC236}">
+                  <a16:creationId xmlns:a16="http://schemas.microsoft.com/office/drawing/2014/main" id="{B03B6076-4E2B-4170-9D2A-44DEB55DE0F1}"/>
+                </a:ext>
+              </a:extLst>
+            </p:cNvPr>
+            <p:cNvPicPr>
+              <a:picLocks noChangeAspect="1"/>
+            </p:cNvPicPr>
+            <p:nvPr/>
+          </p:nvPicPr>
+          <p:blipFill>
+            <a:blip r:embed="rId11"/>
+            <a:stretch>
+              <a:fillRect/>
+            </a:stretch>
+          </p:blipFill>
+          <p:spPr>
+            <a:xfrm>
+              <a:off x="1373795" y="4530286"/>
+              <a:ext cx="1685446" cy="666278"/>
+            </a:xfrm>
+            <a:prstGeom prst="rect">
+              <a:avLst/>
+            </a:prstGeom>
+          </p:spPr>
+        </p:pic>
+      </p:grpSp>
+      <p:grpSp>
+        <p:nvGrpSpPr>
+          <p:cNvPr id="19" name="Grupa 18">
+            <a:extLst>
+              <a:ext uri="{FF2B5EF4-FFF2-40B4-BE49-F238E27FC236}">
+                <a16:creationId xmlns:a16="http://schemas.microsoft.com/office/drawing/2014/main" id="{B86586E8-A692-40A3-AAA2-89430CF42645}"/>
+              </a:ext>
+            </a:extLst>
+          </p:cNvPr>
+          <p:cNvGrpSpPr/>
+          <p:nvPr/>
+        </p:nvGrpSpPr>
+        <p:grpSpPr>
+          <a:xfrm>
+            <a:off x="5739468" y="1892182"/>
+            <a:ext cx="6316070" cy="3429922"/>
+            <a:chOff x="0" y="1892182"/>
+            <a:chExt cx="6316070" cy="3429922"/>
+          </a:xfrm>
+        </p:grpSpPr>
+        <p:graphicFrame>
+          <p:nvGraphicFramePr>
+            <p:cNvPr id="20" name="Diagram 19">
+              <a:extLst>
+                <a:ext uri="{FF2B5EF4-FFF2-40B4-BE49-F238E27FC236}">
+                  <a16:creationId xmlns:a16="http://schemas.microsoft.com/office/drawing/2014/main" id="{8B4C87CF-B829-442E-8344-46F3882E34BD}"/>
+                </a:ext>
+              </a:extLst>
+            </p:cNvPr>
+            <p:cNvGraphicFramePr/>
+            <p:nvPr>
+              <p:extLst>
+                <p:ext uri="{D42A27DB-BD31-4B8C-83A1-F6EECF244321}">
+                  <p14:modId xmlns:p14="http://schemas.microsoft.com/office/powerpoint/2010/main" val="1895254172"/>
+                </p:ext>
+              </p:extLst>
+            </p:nvPr>
+          </p:nvGraphicFramePr>
+          <p:xfrm>
+            <a:off x="0" y="1892182"/>
+            <a:ext cx="6316070" cy="3429922"/>
+          </p:xfrm>
+          <a:graphic>
+            <a:graphicData uri="http://schemas.openxmlformats.org/drawingml/2006/diagram">
+              <dgm:relIds xmlns:dgm="http://schemas.openxmlformats.org/drawingml/2006/diagram" xmlns:r="http://schemas.openxmlformats.org/officeDocument/2006/relationships" r:dm="rId12" r:lo="rId13" r:qs="rId14" r:cs="rId15"/>
+            </a:graphicData>
+          </a:graphic>
+        </p:graphicFrame>
+        <p:pic>
+          <p:nvPicPr>
+            <p:cNvPr id="21" name="Obraz 20" descr="Obraz zawierający tekst, znak&#10;&#10;Opis wygenerowany przy wysokim poziomie pewności">
+              <a:extLst>
+                <a:ext uri="{FF2B5EF4-FFF2-40B4-BE49-F238E27FC236}">
+                  <a16:creationId xmlns:a16="http://schemas.microsoft.com/office/drawing/2014/main" id="{1800C2A6-D8A6-4293-8186-C6C34AE7354A}"/>
+                </a:ext>
+              </a:extLst>
+            </p:cNvPr>
+            <p:cNvPicPr>
+              <a:picLocks noChangeAspect="1"/>
+            </p:cNvPicPr>
+            <p:nvPr/>
+          </p:nvPicPr>
+          <p:blipFill>
+            <a:blip r:embed="rId7">
+              <a:extLst>
+                <a:ext uri="{837473B0-CC2E-450A-ABE3-18F120FF3D39}">
+                  <a1611:picAttrSrcUrl xmlns:a1611="http://schemas.microsoft.com/office/drawing/2016/11/main" r:id="rId8"/>
+                </a:ext>
+              </a:extLst>
+            </a:blip>
+            <a:stretch>
+              <a:fillRect/>
+            </a:stretch>
+          </p:blipFill>
+          <p:spPr>
+            <a:xfrm>
+              <a:off x="1932832" y="3762595"/>
+              <a:ext cx="376272" cy="376272"/>
+            </a:xfrm>
+            <a:prstGeom prst="rect">
+              <a:avLst/>
+            </a:prstGeom>
+          </p:spPr>
+        </p:pic>
+        <p:pic>
+          <p:nvPicPr>
+            <p:cNvPr id="22" name="Obraz 21">
+              <a:extLst>
+                <a:ext uri="{FF2B5EF4-FFF2-40B4-BE49-F238E27FC236}">
+                  <a16:creationId xmlns:a16="http://schemas.microsoft.com/office/drawing/2014/main" id="{593AD937-1EA8-41D0-B54E-A5DA7BFBFA0D}"/>
+                </a:ext>
+              </a:extLst>
+            </p:cNvPr>
+            <p:cNvPicPr>
+              <a:picLocks noChangeAspect="1"/>
+            </p:cNvPicPr>
+            <p:nvPr/>
+          </p:nvPicPr>
+          <p:blipFill>
+            <a:blip r:embed="rId9">
+              <a:extLst>
+                <a:ext uri="{837473B0-CC2E-450A-ABE3-18F120FF3D39}">
+                  <a1611:picAttrSrcUrl xmlns:a1611="http://schemas.microsoft.com/office/drawing/2016/11/main" r:id="rId10"/>
+                </a:ext>
+              </a:extLst>
+            </a:blip>
+            <a:stretch>
+              <a:fillRect/>
+            </a:stretch>
+          </p:blipFill>
+          <p:spPr>
+            <a:xfrm>
+              <a:off x="1895820" y="4152225"/>
+              <a:ext cx="438242" cy="438242"/>
+            </a:xfrm>
+            <a:prstGeom prst="rect">
+              <a:avLst/>
+            </a:prstGeom>
+          </p:spPr>
+        </p:pic>
+        <p:pic>
+          <p:nvPicPr>
+            <p:cNvPr id="23" name="Obraz 22" descr="Obraz zawierający niebo, zewnętrzne&#10;&#10;Opis wygenerowany przy wysokim poziomie pewności">
+              <a:extLst>
+                <a:ext uri="{FF2B5EF4-FFF2-40B4-BE49-F238E27FC236}">
+                  <a16:creationId xmlns:a16="http://schemas.microsoft.com/office/drawing/2014/main" id="{92167F14-F089-4F24-981A-2919931C0AEA}"/>
+                </a:ext>
+              </a:extLst>
+            </p:cNvPr>
+            <p:cNvPicPr>
+              <a:picLocks noChangeAspect="1"/>
+            </p:cNvPicPr>
+            <p:nvPr/>
+          </p:nvPicPr>
+          <p:blipFill>
+            <a:blip r:embed="rId11"/>
+            <a:stretch>
+              <a:fillRect/>
+            </a:stretch>
+          </p:blipFill>
+          <p:spPr>
+            <a:xfrm>
+              <a:off x="1278245" y="4530286"/>
+              <a:ext cx="1685446" cy="666278"/>
+            </a:xfrm>
+            <a:prstGeom prst="rect">
+              <a:avLst/>
+            </a:prstGeom>
+          </p:spPr>
+        </p:pic>
+      </p:grpSp>
+    </p:spTree>
+    <p:extLst>
+      <p:ext uri="{BB962C8B-B14F-4D97-AF65-F5344CB8AC3E}">
+        <p14:creationId xmlns:p14="http://schemas.microsoft.com/office/powerpoint/2010/main" val="4061770306"/>
+      </p:ext>
+    </p:extLst>
+  </p:cSld>
+  <p:clrMapOvr>
+    <a:masterClrMapping/>
+  </p:clrMapOvr>
+</p:sld>
+</file>
+
+<file path=ppt/slides/slide11.xml><?xml version="1.0" encoding="utf-8"?>
+<p:sld xmlns:a="http://schemas.openxmlformats.org/drawingml/2006/main" xmlns:r="http://schemas.openxmlformats.org/officeDocument/2006/relationships" xmlns:p="http://schemas.openxmlformats.org/presentationml/2006/main">
+  <p:cSld>
+    <p:spTree>
+      <p:nvGrpSpPr>
+        <p:cNvPr id="1" name=""/>
+        <p:cNvGrpSpPr/>
+        <p:nvPr/>
+      </p:nvGrpSpPr>
+      <p:grpSpPr>
+        <a:xfrm>
+          <a:off x="0" y="0"/>
+          <a:ext cx="0" cy="0"/>
+          <a:chOff x="0" y="0"/>
+          <a:chExt cx="0" cy="0"/>
+        </a:xfrm>
+      </p:grpSpPr>
+      <p:sp>
+        <p:nvSpPr>
+          <p:cNvPr id="2" name="Tytuł 1">
+            <a:extLst>
+              <a:ext uri="{FF2B5EF4-FFF2-40B4-BE49-F238E27FC236}">
+                <a16:creationId xmlns:a16="http://schemas.microsoft.com/office/drawing/2014/main" id="{ABC53672-EF4B-4831-9E38-12951B158619}"/>
+              </a:ext>
+            </a:extLst>
+          </p:cNvPr>
+          <p:cNvSpPr>
+            <a:spLocks noGrp="1"/>
+          </p:cNvSpPr>
+          <p:nvPr>
+            <p:ph type="title"/>
+          </p:nvPr>
+        </p:nvSpPr>
+        <p:spPr/>
+        <p:txBody>
+          <a:bodyPr/>
+          <a:lstStyle/>
+          <a:p>
+            <a:r>
+              <a:rPr lang="pl-PL" dirty="0"/>
+              <a:t>Przykład</a:t>
+            </a:r>
+          </a:p>
+        </p:txBody>
+      </p:sp>
+      <p:grpSp>
+        <p:nvGrpSpPr>
+          <p:cNvPr id="8" name="Grupa 7">
+            <a:extLst>
+              <a:ext uri="{FF2B5EF4-FFF2-40B4-BE49-F238E27FC236}">
+                <a16:creationId xmlns:a16="http://schemas.microsoft.com/office/drawing/2014/main" id="{91FDE43D-B8A5-4B93-9EE3-2ED73D1D903B}"/>
+              </a:ext>
+            </a:extLst>
+          </p:cNvPr>
+          <p:cNvGrpSpPr/>
+          <p:nvPr/>
+        </p:nvGrpSpPr>
+        <p:grpSpPr>
+          <a:xfrm>
+            <a:off x="0" y="1892182"/>
+            <a:ext cx="6316070" cy="3429922"/>
+            <a:chOff x="0" y="1892182"/>
+            <a:chExt cx="6316070" cy="3429922"/>
+          </a:xfrm>
+        </p:grpSpPr>
+        <p:graphicFrame>
+          <p:nvGraphicFramePr>
+            <p:cNvPr id="4" name="Diagram 3">
+              <a:extLst>
+                <a:ext uri="{FF2B5EF4-FFF2-40B4-BE49-F238E27FC236}">
+                  <a16:creationId xmlns:a16="http://schemas.microsoft.com/office/drawing/2014/main" id="{04D11AEF-FB9A-4BD3-ABC4-0314E8D30E30}"/>
+                </a:ext>
+              </a:extLst>
+            </p:cNvPr>
+            <p:cNvGraphicFramePr/>
+            <p:nvPr>
+              <p:extLst>
+                <p:ext uri="{D42A27DB-BD31-4B8C-83A1-F6EECF244321}">
+                  <p14:modId xmlns:p14="http://schemas.microsoft.com/office/powerpoint/2010/main" val="3161024841"/>
+                </p:ext>
+              </p:extLst>
+            </p:nvPr>
+          </p:nvGraphicFramePr>
+          <p:xfrm>
+            <a:off x="0" y="1892182"/>
+            <a:ext cx="6316070" cy="3429922"/>
+          </p:xfrm>
+          <a:graphic>
+            <a:graphicData uri="http://schemas.openxmlformats.org/drawingml/2006/diagram">
+              <dgm:relIds xmlns:dgm="http://schemas.openxmlformats.org/drawingml/2006/diagram" xmlns:r="http://schemas.openxmlformats.org/officeDocument/2006/relationships" r:dm="rId2" r:lo="rId3" r:qs="rId4" r:cs="rId5"/>
+            </a:graphicData>
+          </a:graphic>
+        </p:graphicFrame>
+        <p:pic>
+          <p:nvPicPr>
+            <p:cNvPr id="5" name="Obraz 4" descr="Obraz zawierający tekst, znak&#10;&#10;Opis wygenerowany przy wysokim poziomie pewności">
+              <a:extLst>
+                <a:ext uri="{FF2B5EF4-FFF2-40B4-BE49-F238E27FC236}">
+                  <a16:creationId xmlns:a16="http://schemas.microsoft.com/office/drawing/2014/main" id="{8475C1EA-C10C-46AC-B2ED-21E16000A1ED}"/>
+                </a:ext>
+              </a:extLst>
+            </p:cNvPr>
+            <p:cNvPicPr>
+              <a:picLocks noChangeAspect="1"/>
+            </p:cNvPicPr>
+            <p:nvPr/>
+          </p:nvPicPr>
+          <p:blipFill>
+            <a:blip r:embed="rId7">
+              <a:extLst>
+                <a:ext uri="{837473B0-CC2E-450A-ABE3-18F120FF3D39}">
+                  <a1611:picAttrSrcUrl xmlns:a1611="http://schemas.microsoft.com/office/drawing/2016/11/main" r:id="rId8"/>
+                </a:ext>
+              </a:extLst>
+            </a:blip>
+            <a:stretch>
+              <a:fillRect/>
+            </a:stretch>
+          </p:blipFill>
+          <p:spPr>
+            <a:xfrm>
+              <a:off x="1997397" y="3762595"/>
+              <a:ext cx="376272" cy="376272"/>
+            </a:xfrm>
+            <a:prstGeom prst="rect">
+              <a:avLst/>
+            </a:prstGeom>
+          </p:spPr>
+        </p:pic>
+        <p:pic>
+          <p:nvPicPr>
+            <p:cNvPr id="6" name="Obraz 5">
+              <a:extLst>
+                <a:ext uri="{FF2B5EF4-FFF2-40B4-BE49-F238E27FC236}">
+                  <a16:creationId xmlns:a16="http://schemas.microsoft.com/office/drawing/2014/main" id="{67DD1412-5BB4-413D-B915-E4F0F76688DC}"/>
+                </a:ext>
+              </a:extLst>
+            </p:cNvPr>
+            <p:cNvPicPr>
+              <a:picLocks noChangeAspect="1"/>
+            </p:cNvPicPr>
+            <p:nvPr/>
+          </p:nvPicPr>
+          <p:blipFill>
+            <a:blip r:embed="rId9">
+              <a:extLst>
+                <a:ext uri="{837473B0-CC2E-450A-ABE3-18F120FF3D39}">
+                  <a1611:picAttrSrcUrl xmlns:a1611="http://schemas.microsoft.com/office/drawing/2016/11/main" r:id="rId10"/>
+                </a:ext>
+              </a:extLst>
+            </a:blip>
+            <a:stretch>
+              <a:fillRect/>
+            </a:stretch>
+          </p:blipFill>
+          <p:spPr>
+            <a:xfrm>
+              <a:off x="1966412" y="4152225"/>
+              <a:ext cx="438242" cy="438242"/>
+            </a:xfrm>
+            <a:prstGeom prst="rect">
+              <a:avLst/>
+            </a:prstGeom>
+          </p:spPr>
+        </p:pic>
+        <p:pic>
+          <p:nvPicPr>
+            <p:cNvPr id="7" name="Obraz 6" descr="Obraz zawierający niebo, zewnętrzne&#10;&#10;Opis wygenerowany przy wysokim poziomie pewności">
+              <a:extLst>
+                <a:ext uri="{FF2B5EF4-FFF2-40B4-BE49-F238E27FC236}">
+                  <a16:creationId xmlns:a16="http://schemas.microsoft.com/office/drawing/2014/main" id="{B03B6076-4E2B-4170-9D2A-44DEB55DE0F1}"/>
+                </a:ext>
+              </a:extLst>
+            </p:cNvPr>
+            <p:cNvPicPr>
+              <a:picLocks noChangeAspect="1"/>
+            </p:cNvPicPr>
+            <p:nvPr/>
+          </p:nvPicPr>
+          <p:blipFill>
+            <a:blip r:embed="rId11"/>
+            <a:stretch>
+              <a:fillRect/>
+            </a:stretch>
+          </p:blipFill>
+          <p:spPr>
+            <a:xfrm>
+              <a:off x="1373795" y="4530286"/>
+              <a:ext cx="1685446" cy="666278"/>
+            </a:xfrm>
+            <a:prstGeom prst="rect">
+              <a:avLst/>
+            </a:prstGeom>
+          </p:spPr>
+        </p:pic>
+      </p:grpSp>
+      <p:grpSp>
+        <p:nvGrpSpPr>
+          <p:cNvPr id="19" name="Grupa 18">
+            <a:extLst>
+              <a:ext uri="{FF2B5EF4-FFF2-40B4-BE49-F238E27FC236}">
+                <a16:creationId xmlns:a16="http://schemas.microsoft.com/office/drawing/2014/main" id="{B86586E8-A692-40A3-AAA2-89430CF42645}"/>
+              </a:ext>
+            </a:extLst>
+          </p:cNvPr>
+          <p:cNvGrpSpPr/>
+          <p:nvPr/>
+        </p:nvGrpSpPr>
+        <p:grpSpPr>
+          <a:xfrm>
+            <a:off x="5739468" y="1892182"/>
+            <a:ext cx="6316070" cy="3429922"/>
+            <a:chOff x="0" y="1892182"/>
+            <a:chExt cx="6316070" cy="3429922"/>
+          </a:xfrm>
+        </p:grpSpPr>
+        <p:graphicFrame>
+          <p:nvGraphicFramePr>
+            <p:cNvPr id="20" name="Diagram 19">
+              <a:extLst>
+                <a:ext uri="{FF2B5EF4-FFF2-40B4-BE49-F238E27FC236}">
+                  <a16:creationId xmlns:a16="http://schemas.microsoft.com/office/drawing/2014/main" id="{8B4C87CF-B829-442E-8344-46F3882E34BD}"/>
+                </a:ext>
+              </a:extLst>
+            </p:cNvPr>
+            <p:cNvGraphicFramePr/>
+            <p:nvPr>
+              <p:extLst>
+                <p:ext uri="{D42A27DB-BD31-4B8C-83A1-F6EECF244321}">
+                  <p14:modId xmlns:p14="http://schemas.microsoft.com/office/powerpoint/2010/main" val="2826778112"/>
+                </p:ext>
+              </p:extLst>
+            </p:nvPr>
+          </p:nvGraphicFramePr>
+          <p:xfrm>
+            <a:off x="0" y="1892182"/>
+            <a:ext cx="6316070" cy="3429922"/>
+          </p:xfrm>
+          <a:graphic>
+            <a:graphicData uri="http://schemas.openxmlformats.org/drawingml/2006/diagram">
+              <dgm:relIds xmlns:dgm="http://schemas.openxmlformats.org/drawingml/2006/diagram" xmlns:r="http://schemas.openxmlformats.org/officeDocument/2006/relationships" r:dm="rId12" r:lo="rId13" r:qs="rId14" r:cs="rId15"/>
+            </a:graphicData>
+          </a:graphic>
+        </p:graphicFrame>
+        <p:pic>
+          <p:nvPicPr>
+            <p:cNvPr id="21" name="Obraz 20" descr="Obraz zawierający tekst, znak&#10;&#10;Opis wygenerowany przy wysokim poziomie pewności">
+              <a:extLst>
+                <a:ext uri="{FF2B5EF4-FFF2-40B4-BE49-F238E27FC236}">
+                  <a16:creationId xmlns:a16="http://schemas.microsoft.com/office/drawing/2014/main" id="{1800C2A6-D8A6-4293-8186-C6C34AE7354A}"/>
+                </a:ext>
+              </a:extLst>
+            </p:cNvPr>
+            <p:cNvPicPr>
+              <a:picLocks noChangeAspect="1"/>
+            </p:cNvPicPr>
+            <p:nvPr/>
+          </p:nvPicPr>
+          <p:blipFill>
+            <a:blip r:embed="rId7">
+              <a:extLst>
+                <a:ext uri="{837473B0-CC2E-450A-ABE3-18F120FF3D39}">
+                  <a1611:picAttrSrcUrl xmlns:a1611="http://schemas.microsoft.com/office/drawing/2016/11/main" r:id="rId8"/>
+                </a:ext>
+              </a:extLst>
+            </a:blip>
+            <a:stretch>
+              <a:fillRect/>
+            </a:stretch>
+          </p:blipFill>
+          <p:spPr>
+            <a:xfrm>
+              <a:off x="1932832" y="3762595"/>
+              <a:ext cx="376272" cy="376272"/>
+            </a:xfrm>
+            <a:prstGeom prst="rect">
+              <a:avLst/>
+            </a:prstGeom>
+          </p:spPr>
+        </p:pic>
+        <p:pic>
+          <p:nvPicPr>
+            <p:cNvPr id="22" name="Obraz 21">
+              <a:extLst>
+                <a:ext uri="{FF2B5EF4-FFF2-40B4-BE49-F238E27FC236}">
+                  <a16:creationId xmlns:a16="http://schemas.microsoft.com/office/drawing/2014/main" id="{593AD937-1EA8-41D0-B54E-A5DA7BFBFA0D}"/>
+                </a:ext>
+              </a:extLst>
+            </p:cNvPr>
+            <p:cNvPicPr>
+              <a:picLocks noChangeAspect="1"/>
+            </p:cNvPicPr>
+            <p:nvPr/>
+          </p:nvPicPr>
+          <p:blipFill>
+            <a:blip r:embed="rId9">
+              <a:extLst>
+                <a:ext uri="{837473B0-CC2E-450A-ABE3-18F120FF3D39}">
+                  <a1611:picAttrSrcUrl xmlns:a1611="http://schemas.microsoft.com/office/drawing/2016/11/main" r:id="rId10"/>
+                </a:ext>
+              </a:extLst>
+            </a:blip>
+            <a:stretch>
+              <a:fillRect/>
+            </a:stretch>
+          </p:blipFill>
+          <p:spPr>
+            <a:xfrm>
+              <a:off x="1895820" y="4152225"/>
+              <a:ext cx="438242" cy="438242"/>
+            </a:xfrm>
+            <a:prstGeom prst="rect">
+              <a:avLst/>
+            </a:prstGeom>
+          </p:spPr>
+        </p:pic>
+        <p:pic>
+          <p:nvPicPr>
+            <p:cNvPr id="23" name="Obraz 22" descr="Obraz zawierający niebo, zewnętrzne&#10;&#10;Opis wygenerowany przy wysokim poziomie pewności">
+              <a:extLst>
+                <a:ext uri="{FF2B5EF4-FFF2-40B4-BE49-F238E27FC236}">
+                  <a16:creationId xmlns:a16="http://schemas.microsoft.com/office/drawing/2014/main" id="{92167F14-F089-4F24-981A-2919931C0AEA}"/>
+                </a:ext>
+              </a:extLst>
+            </p:cNvPr>
+            <p:cNvPicPr>
+              <a:picLocks noChangeAspect="1"/>
+            </p:cNvPicPr>
+            <p:nvPr/>
+          </p:nvPicPr>
+          <p:blipFill>
+            <a:blip r:embed="rId11"/>
+            <a:stretch>
+              <a:fillRect/>
+            </a:stretch>
+          </p:blipFill>
+          <p:spPr>
+            <a:xfrm>
+              <a:off x="1278245" y="4530286"/>
+              <a:ext cx="1685446" cy="666278"/>
+            </a:xfrm>
+            <a:prstGeom prst="rect">
+              <a:avLst/>
+            </a:prstGeom>
+          </p:spPr>
+        </p:pic>
+      </p:grpSp>
+    </p:spTree>
+    <p:extLst>
+      <p:ext uri="{BB962C8B-B14F-4D97-AF65-F5344CB8AC3E}">
+        <p14:creationId xmlns:p14="http://schemas.microsoft.com/office/powerpoint/2010/main" val="2266060619"/>
+      </p:ext>
+    </p:extLst>
+  </p:cSld>
+  <p:clrMapOvr>
+    <a:masterClrMapping/>
+  </p:clrMapOvr>
+</p:sld>
+</file>
+
+<file path=ppt/slides/slide12.xml><?xml version="1.0" encoding="utf-8"?>
+<p:sld xmlns:a="http://schemas.openxmlformats.org/drawingml/2006/main" xmlns:r="http://schemas.openxmlformats.org/officeDocument/2006/relationships" xmlns:p="http://schemas.openxmlformats.org/presentationml/2006/main">
+  <p:cSld>
+    <p:spTree>
+      <p:nvGrpSpPr>
+        <p:cNvPr id="1" name=""/>
+        <p:cNvGrpSpPr/>
+        <p:nvPr/>
+      </p:nvGrpSpPr>
+      <p:grpSpPr>
+        <a:xfrm>
+          <a:off x="0" y="0"/>
+          <a:ext cx="0" cy="0"/>
+          <a:chOff x="0" y="0"/>
+          <a:chExt cx="0" cy="0"/>
+        </a:xfrm>
+      </p:grpSpPr>
+      <p:sp>
+        <p:nvSpPr>
+          <p:cNvPr id="2" name="Tytuł 1">
+            <a:extLst>
+              <a:ext uri="{FF2B5EF4-FFF2-40B4-BE49-F238E27FC236}">
+                <a16:creationId xmlns:a16="http://schemas.microsoft.com/office/drawing/2014/main" id="{ABC53672-EF4B-4831-9E38-12951B158619}"/>
+              </a:ext>
+            </a:extLst>
+          </p:cNvPr>
+          <p:cNvSpPr>
+            <a:spLocks noGrp="1"/>
+          </p:cNvSpPr>
+          <p:nvPr>
+            <p:ph type="title"/>
+          </p:nvPr>
+        </p:nvSpPr>
+        <p:spPr/>
+        <p:txBody>
+          <a:bodyPr/>
+          <a:lstStyle/>
+          <a:p>
+            <a:r>
+              <a:rPr lang="pl-PL" dirty="0"/>
+              <a:t>Przykład</a:t>
+            </a:r>
+          </a:p>
+        </p:txBody>
+      </p:sp>
+      <p:grpSp>
+        <p:nvGrpSpPr>
+          <p:cNvPr id="8" name="Grupa 7">
+            <a:extLst>
+              <a:ext uri="{FF2B5EF4-FFF2-40B4-BE49-F238E27FC236}">
+                <a16:creationId xmlns:a16="http://schemas.microsoft.com/office/drawing/2014/main" id="{91FDE43D-B8A5-4B93-9EE3-2ED73D1D903B}"/>
+              </a:ext>
+            </a:extLst>
+          </p:cNvPr>
+          <p:cNvGrpSpPr/>
+          <p:nvPr/>
+        </p:nvGrpSpPr>
+        <p:grpSpPr>
+          <a:xfrm>
+            <a:off x="0" y="1892182"/>
+            <a:ext cx="6316070" cy="3429922"/>
+            <a:chOff x="0" y="1892182"/>
+            <a:chExt cx="6316070" cy="3429922"/>
+          </a:xfrm>
+        </p:grpSpPr>
+        <p:graphicFrame>
+          <p:nvGraphicFramePr>
+            <p:cNvPr id="4" name="Diagram 3">
+              <a:extLst>
+                <a:ext uri="{FF2B5EF4-FFF2-40B4-BE49-F238E27FC236}">
+                  <a16:creationId xmlns:a16="http://schemas.microsoft.com/office/drawing/2014/main" id="{04D11AEF-FB9A-4BD3-ABC4-0314E8D30E30}"/>
+                </a:ext>
+              </a:extLst>
+            </p:cNvPr>
+            <p:cNvGraphicFramePr/>
+            <p:nvPr>
+              <p:extLst>
+                <p:ext uri="{D42A27DB-BD31-4B8C-83A1-F6EECF244321}">
+                  <p14:modId xmlns:p14="http://schemas.microsoft.com/office/powerpoint/2010/main" val="1530354962"/>
+                </p:ext>
+              </p:extLst>
+            </p:nvPr>
+          </p:nvGraphicFramePr>
+          <p:xfrm>
+            <a:off x="0" y="1892182"/>
+            <a:ext cx="6316070" cy="3429922"/>
+          </p:xfrm>
+          <a:graphic>
+            <a:graphicData uri="http://schemas.openxmlformats.org/drawingml/2006/diagram">
+              <dgm:relIds xmlns:dgm="http://schemas.openxmlformats.org/drawingml/2006/diagram" xmlns:r="http://schemas.openxmlformats.org/officeDocument/2006/relationships" r:dm="rId2" r:lo="rId3" r:qs="rId4" r:cs="rId5"/>
+            </a:graphicData>
+          </a:graphic>
+        </p:graphicFrame>
+        <p:pic>
+          <p:nvPicPr>
+            <p:cNvPr id="5" name="Obraz 4" descr="Obraz zawierający tekst, znak&#10;&#10;Opis wygenerowany przy wysokim poziomie pewności">
+              <a:extLst>
+                <a:ext uri="{FF2B5EF4-FFF2-40B4-BE49-F238E27FC236}">
+                  <a16:creationId xmlns:a16="http://schemas.microsoft.com/office/drawing/2014/main" id="{8475C1EA-C10C-46AC-B2ED-21E16000A1ED}"/>
+                </a:ext>
+              </a:extLst>
+            </p:cNvPr>
+            <p:cNvPicPr>
+              <a:picLocks noChangeAspect="1"/>
+            </p:cNvPicPr>
+            <p:nvPr/>
+          </p:nvPicPr>
+          <p:blipFill>
+            <a:blip r:embed="rId7">
+              <a:extLst>
+                <a:ext uri="{837473B0-CC2E-450A-ABE3-18F120FF3D39}">
+                  <a1611:picAttrSrcUrl xmlns:a1611="http://schemas.microsoft.com/office/drawing/2016/11/main" r:id="rId8"/>
+                </a:ext>
+              </a:extLst>
+            </a:blip>
+            <a:stretch>
+              <a:fillRect/>
+            </a:stretch>
+          </p:blipFill>
+          <p:spPr>
+            <a:xfrm>
+              <a:off x="1997397" y="3762595"/>
+              <a:ext cx="376272" cy="376272"/>
+            </a:xfrm>
+            <a:prstGeom prst="rect">
+              <a:avLst/>
+            </a:prstGeom>
+          </p:spPr>
+        </p:pic>
+        <p:pic>
+          <p:nvPicPr>
+            <p:cNvPr id="6" name="Obraz 5">
+              <a:extLst>
+                <a:ext uri="{FF2B5EF4-FFF2-40B4-BE49-F238E27FC236}">
+                  <a16:creationId xmlns:a16="http://schemas.microsoft.com/office/drawing/2014/main" id="{67DD1412-5BB4-413D-B915-E4F0F76688DC}"/>
+                </a:ext>
+              </a:extLst>
+            </p:cNvPr>
+            <p:cNvPicPr>
+              <a:picLocks noChangeAspect="1"/>
+            </p:cNvPicPr>
+            <p:nvPr/>
+          </p:nvPicPr>
+          <p:blipFill>
+            <a:blip r:embed="rId9">
+              <a:extLst>
+                <a:ext uri="{837473B0-CC2E-450A-ABE3-18F120FF3D39}">
+                  <a1611:picAttrSrcUrl xmlns:a1611="http://schemas.microsoft.com/office/drawing/2016/11/main" r:id="rId10"/>
+                </a:ext>
+              </a:extLst>
+            </a:blip>
+            <a:stretch>
+              <a:fillRect/>
+            </a:stretch>
+          </p:blipFill>
+          <p:spPr>
+            <a:xfrm>
+              <a:off x="1966412" y="4152225"/>
+              <a:ext cx="438242" cy="438242"/>
+            </a:xfrm>
+            <a:prstGeom prst="rect">
+              <a:avLst/>
+            </a:prstGeom>
+          </p:spPr>
+        </p:pic>
+        <p:pic>
+          <p:nvPicPr>
+            <p:cNvPr id="7" name="Obraz 6" descr="Obraz zawierający niebo, zewnętrzne&#10;&#10;Opis wygenerowany przy wysokim poziomie pewności">
+              <a:extLst>
+                <a:ext uri="{FF2B5EF4-FFF2-40B4-BE49-F238E27FC236}">
+                  <a16:creationId xmlns:a16="http://schemas.microsoft.com/office/drawing/2014/main" id="{B03B6076-4E2B-4170-9D2A-44DEB55DE0F1}"/>
+                </a:ext>
+              </a:extLst>
+            </p:cNvPr>
+            <p:cNvPicPr>
+              <a:picLocks noChangeAspect="1"/>
+            </p:cNvPicPr>
+            <p:nvPr/>
+          </p:nvPicPr>
+          <p:blipFill>
+            <a:blip r:embed="rId11"/>
+            <a:stretch>
+              <a:fillRect/>
+            </a:stretch>
+          </p:blipFill>
+          <p:spPr>
+            <a:xfrm>
+              <a:off x="1373795" y="4530286"/>
+              <a:ext cx="1685446" cy="666278"/>
+            </a:xfrm>
+            <a:prstGeom prst="rect">
+              <a:avLst/>
+            </a:prstGeom>
+          </p:spPr>
+        </p:pic>
+      </p:grpSp>
+      <p:grpSp>
+        <p:nvGrpSpPr>
+          <p:cNvPr id="19" name="Grupa 18">
+            <a:extLst>
+              <a:ext uri="{FF2B5EF4-FFF2-40B4-BE49-F238E27FC236}">
+                <a16:creationId xmlns:a16="http://schemas.microsoft.com/office/drawing/2014/main" id="{B86586E8-A692-40A3-AAA2-89430CF42645}"/>
+              </a:ext>
+            </a:extLst>
+          </p:cNvPr>
+          <p:cNvGrpSpPr/>
+          <p:nvPr/>
+        </p:nvGrpSpPr>
+        <p:grpSpPr>
+          <a:xfrm>
+            <a:off x="5739468" y="1892182"/>
+            <a:ext cx="6316070" cy="3429922"/>
+            <a:chOff x="0" y="1892182"/>
+            <a:chExt cx="6316070" cy="3429922"/>
+          </a:xfrm>
+        </p:grpSpPr>
+        <p:graphicFrame>
+          <p:nvGraphicFramePr>
+            <p:cNvPr id="20" name="Diagram 19">
+              <a:extLst>
+                <a:ext uri="{FF2B5EF4-FFF2-40B4-BE49-F238E27FC236}">
+                  <a16:creationId xmlns:a16="http://schemas.microsoft.com/office/drawing/2014/main" id="{8B4C87CF-B829-442E-8344-46F3882E34BD}"/>
+                </a:ext>
+              </a:extLst>
+            </p:cNvPr>
+            <p:cNvGraphicFramePr/>
+            <p:nvPr>
+              <p:extLst>
+                <p:ext uri="{D42A27DB-BD31-4B8C-83A1-F6EECF244321}">
+                  <p14:modId xmlns:p14="http://schemas.microsoft.com/office/powerpoint/2010/main" val="289921194"/>
+                </p:ext>
+              </p:extLst>
+            </p:nvPr>
+          </p:nvGraphicFramePr>
+          <p:xfrm>
+            <a:off x="0" y="1892182"/>
+            <a:ext cx="6316070" cy="3429922"/>
+          </p:xfrm>
+          <a:graphic>
+            <a:graphicData uri="http://schemas.openxmlformats.org/drawingml/2006/diagram">
+              <dgm:relIds xmlns:dgm="http://schemas.openxmlformats.org/drawingml/2006/diagram" xmlns:r="http://schemas.openxmlformats.org/officeDocument/2006/relationships" r:dm="rId12" r:lo="rId13" r:qs="rId14" r:cs="rId15"/>
+            </a:graphicData>
+          </a:graphic>
+        </p:graphicFrame>
+        <p:pic>
+          <p:nvPicPr>
+            <p:cNvPr id="21" name="Obraz 20" descr="Obraz zawierający tekst, znak&#10;&#10;Opis wygenerowany przy wysokim poziomie pewności">
+              <a:extLst>
+                <a:ext uri="{FF2B5EF4-FFF2-40B4-BE49-F238E27FC236}">
+                  <a16:creationId xmlns:a16="http://schemas.microsoft.com/office/drawing/2014/main" id="{1800C2A6-D8A6-4293-8186-C6C34AE7354A}"/>
+                </a:ext>
+              </a:extLst>
+            </p:cNvPr>
+            <p:cNvPicPr>
+              <a:picLocks noChangeAspect="1"/>
+            </p:cNvPicPr>
+            <p:nvPr/>
+          </p:nvPicPr>
+          <p:blipFill>
+            <a:blip r:embed="rId7">
+              <a:extLst>
+                <a:ext uri="{837473B0-CC2E-450A-ABE3-18F120FF3D39}">
+                  <a1611:picAttrSrcUrl xmlns:a1611="http://schemas.microsoft.com/office/drawing/2016/11/main" r:id="rId8"/>
+                </a:ext>
+              </a:extLst>
+            </a:blip>
+            <a:stretch>
+              <a:fillRect/>
+            </a:stretch>
+          </p:blipFill>
+          <p:spPr>
+            <a:xfrm>
+              <a:off x="1932832" y="3762595"/>
+              <a:ext cx="376272" cy="376272"/>
+            </a:xfrm>
+            <a:prstGeom prst="rect">
+              <a:avLst/>
+            </a:prstGeom>
+          </p:spPr>
+        </p:pic>
+        <p:pic>
+          <p:nvPicPr>
+            <p:cNvPr id="22" name="Obraz 21">
+              <a:extLst>
+                <a:ext uri="{FF2B5EF4-FFF2-40B4-BE49-F238E27FC236}">
+                  <a16:creationId xmlns:a16="http://schemas.microsoft.com/office/drawing/2014/main" id="{593AD937-1EA8-41D0-B54E-A5DA7BFBFA0D}"/>
+                </a:ext>
+              </a:extLst>
+            </p:cNvPr>
+            <p:cNvPicPr>
+              <a:picLocks noChangeAspect="1"/>
+            </p:cNvPicPr>
+            <p:nvPr/>
+          </p:nvPicPr>
+          <p:blipFill>
+            <a:blip r:embed="rId9">
+              <a:extLst>
+                <a:ext uri="{837473B0-CC2E-450A-ABE3-18F120FF3D39}">
+                  <a1611:picAttrSrcUrl xmlns:a1611="http://schemas.microsoft.com/office/drawing/2016/11/main" r:id="rId10"/>
+                </a:ext>
+              </a:extLst>
+            </a:blip>
+            <a:stretch>
+              <a:fillRect/>
+            </a:stretch>
+          </p:blipFill>
+          <p:spPr>
+            <a:xfrm>
+              <a:off x="1895820" y="4152225"/>
+              <a:ext cx="438242" cy="438242"/>
+            </a:xfrm>
+            <a:prstGeom prst="rect">
+              <a:avLst/>
+            </a:prstGeom>
+          </p:spPr>
+        </p:pic>
+        <p:pic>
+          <p:nvPicPr>
+            <p:cNvPr id="23" name="Obraz 22" descr="Obraz zawierający niebo, zewnętrzne&#10;&#10;Opis wygenerowany przy wysokim poziomie pewności">
+              <a:extLst>
+                <a:ext uri="{FF2B5EF4-FFF2-40B4-BE49-F238E27FC236}">
+                  <a16:creationId xmlns:a16="http://schemas.microsoft.com/office/drawing/2014/main" id="{92167F14-F089-4F24-981A-2919931C0AEA}"/>
+                </a:ext>
+              </a:extLst>
+            </p:cNvPr>
+            <p:cNvPicPr>
+              <a:picLocks noChangeAspect="1"/>
+            </p:cNvPicPr>
+            <p:nvPr/>
+          </p:nvPicPr>
+          <p:blipFill>
+            <a:blip r:embed="rId11"/>
+            <a:stretch>
+              <a:fillRect/>
+            </a:stretch>
+          </p:blipFill>
+          <p:spPr>
+            <a:xfrm>
+              <a:off x="1278245" y="4530286"/>
+              <a:ext cx="1685446" cy="666278"/>
+            </a:xfrm>
+            <a:prstGeom prst="rect">
+              <a:avLst/>
+            </a:prstGeom>
+          </p:spPr>
+        </p:pic>
+      </p:grpSp>
+    </p:spTree>
+    <p:extLst>
+      <p:ext uri="{BB962C8B-B14F-4D97-AF65-F5344CB8AC3E}">
+        <p14:creationId xmlns:p14="http://schemas.microsoft.com/office/powerpoint/2010/main" val="2851606754"/>
+      </p:ext>
+    </p:extLst>
+  </p:cSld>
+  <p:clrMapOvr>
+    <a:masterClrMapping/>
+  </p:clrMapOvr>
+</p:sld>
+</file>
+
+<file path=ppt/slides/slide13.xml><?xml version="1.0" encoding="utf-8"?>
+<p:sld xmlns:a="http://schemas.openxmlformats.org/drawingml/2006/main" xmlns:r="http://schemas.openxmlformats.org/officeDocument/2006/relationships" xmlns:p="http://schemas.openxmlformats.org/presentationml/2006/main">
+  <p:cSld>
+    <p:spTree>
+      <p:nvGrpSpPr>
+        <p:cNvPr id="1" name=""/>
+        <p:cNvGrpSpPr/>
+        <p:nvPr/>
+      </p:nvGrpSpPr>
+      <p:grpSpPr>
+        <a:xfrm>
+          <a:off x="0" y="0"/>
+          <a:ext cx="0" cy="0"/>
+          <a:chOff x="0" y="0"/>
+          <a:chExt cx="0" cy="0"/>
+        </a:xfrm>
+      </p:grpSpPr>
+      <p:sp>
+        <p:nvSpPr>
+          <p:cNvPr id="2" name="Tytuł 1">
+            <a:extLst>
+              <a:ext uri="{FF2B5EF4-FFF2-40B4-BE49-F238E27FC236}">
                 <a16:creationId xmlns:a16="http://schemas.microsoft.com/office/drawing/2014/main" id="{52BE09AA-579F-BF42-8567-BED4AC48D258}"/>
               </a:ext>
             </a:extLst>
@@ -30509,7 +31592,7 @@
 </p:sld>
 </file>
 
-<file path=ppt/slides/slide11.xml><?xml version="1.0" encoding="utf-8"?>
+<file path=ppt/slides/slide14.xml><?xml version="1.0" encoding="utf-8"?>
 <p:sld xmlns:a="http://schemas.openxmlformats.org/drawingml/2006/main" xmlns:r="http://schemas.openxmlformats.org/officeDocument/2006/relationships" xmlns:p="http://schemas.openxmlformats.org/presentationml/2006/main">
   <p:cSld>
     <p:spTree>
@@ -31075,7 +32158,7 @@
               <a:t>Jeżeli utworzymy zmienną x w funkcji to </a:t>
             </a:r>
             <a:r>
-              <a:rPr lang="pl-PL" dirty="0">
+              <a:rPr lang="pl-PL" b="1" dirty="0">
                 <a:solidFill>
                   <a:srgbClr val="FF0000"/>
                 </a:solidFill>
@@ -31168,7 +32251,195 @@
         </p:nvSpPr>
         <p:spPr/>
         <p:txBody>
+          <a:bodyPr>
+            <a:normAutofit lnSpcReduction="10000"/>
+          </a:bodyPr>
+          <a:lstStyle/>
+          <a:p>
+            <a:pPr marL="0" indent="0">
+              <a:buNone/>
+            </a:pPr>
+            <a:r>
+              <a:rPr lang="pl-PL" dirty="0"/>
+              <a:t>zmienna x = 10</a:t>
+            </a:r>
+          </a:p>
+          <a:p>
+            <a:pPr marL="0" indent="0">
+              <a:buNone/>
+            </a:pPr>
+            <a:endParaRPr lang="pl-PL" dirty="0"/>
+          </a:p>
+          <a:p>
+            <a:pPr marL="0" indent="0">
+              <a:buNone/>
+            </a:pPr>
+            <a:r>
+              <a:rPr lang="pl-PL" dirty="0"/>
+              <a:t>funkcja f():</a:t>
+            </a:r>
+          </a:p>
+          <a:p>
+            <a:pPr marL="0" indent="0">
+              <a:buNone/>
+            </a:pPr>
+            <a:r>
+              <a:rPr lang="pl-PL" dirty="0"/>
+              <a:t>	zmienna x = 5</a:t>
+            </a:r>
+          </a:p>
+          <a:p>
+            <a:pPr marL="0" indent="0">
+              <a:buNone/>
+            </a:pPr>
+            <a:r>
+              <a:rPr lang="pl-PL" dirty="0"/>
+              <a:t>	wypisz x</a:t>
+            </a:r>
+            <a:endParaRPr lang="pl-PL" dirty="0">
+              <a:solidFill>
+                <a:schemeClr val="accent1"/>
+              </a:solidFill>
+            </a:endParaRPr>
+          </a:p>
+          <a:p>
+            <a:pPr marL="0" indent="0">
+              <a:buNone/>
+            </a:pPr>
+            <a:endParaRPr lang="pl-PL" dirty="0">
+              <a:solidFill>
+                <a:schemeClr val="accent1"/>
+              </a:solidFill>
+            </a:endParaRPr>
+          </a:p>
+          <a:p>
+            <a:pPr marL="0" indent="0">
+              <a:buNone/>
+            </a:pPr>
+            <a:r>
+              <a:rPr lang="pl-PL" dirty="0"/>
+              <a:t>wypisz x</a:t>
+            </a:r>
+            <a:endParaRPr lang="pl-PL" dirty="0">
+              <a:solidFill>
+                <a:schemeClr val="accent1"/>
+              </a:solidFill>
+            </a:endParaRPr>
+          </a:p>
+          <a:p>
+            <a:pPr marL="0" indent="0">
+              <a:buNone/>
+            </a:pPr>
+            <a:r>
+              <a:rPr lang="pl-PL" dirty="0"/>
+              <a:t>wywołaj f()</a:t>
+            </a:r>
+          </a:p>
+          <a:p>
+            <a:pPr marL="0" indent="0">
+              <a:buNone/>
+            </a:pPr>
+            <a:r>
+              <a:rPr lang="pl-PL" dirty="0"/>
+              <a:t>wypisz x</a:t>
+            </a:r>
+            <a:endParaRPr lang="pl-PL" dirty="0">
+              <a:solidFill>
+                <a:schemeClr val="accent1"/>
+              </a:solidFill>
+            </a:endParaRPr>
+          </a:p>
+          <a:p>
+            <a:pPr marL="0" indent="0">
+              <a:buNone/>
+            </a:pPr>
+            <a:endParaRPr lang="pl-PL" dirty="0">
+              <a:solidFill>
+                <a:schemeClr val="accent1"/>
+              </a:solidFill>
+            </a:endParaRPr>
+          </a:p>
+        </p:txBody>
+      </p:sp>
+    </p:spTree>
+    <p:extLst>
+      <p:ext uri="{BB962C8B-B14F-4D97-AF65-F5344CB8AC3E}">
+        <p14:creationId xmlns:p14="http://schemas.microsoft.com/office/powerpoint/2010/main" val="2584133622"/>
+      </p:ext>
+    </p:extLst>
+  </p:cSld>
+  <p:clrMapOvr>
+    <a:masterClrMapping/>
+  </p:clrMapOvr>
+</p:sld>
+</file>
+
+<file path=ppt/slides/slide6.xml><?xml version="1.0" encoding="utf-8"?>
+<p:sld xmlns:a="http://schemas.openxmlformats.org/drawingml/2006/main" xmlns:r="http://schemas.openxmlformats.org/officeDocument/2006/relationships" xmlns:p="http://schemas.openxmlformats.org/presentationml/2006/main">
+  <p:cSld>
+    <p:spTree>
+      <p:nvGrpSpPr>
+        <p:cNvPr id="1" name=""/>
+        <p:cNvGrpSpPr/>
+        <p:nvPr/>
+      </p:nvGrpSpPr>
+      <p:grpSpPr>
+        <a:xfrm>
+          <a:off x="0" y="0"/>
+          <a:ext cx="0" cy="0"/>
+          <a:chOff x="0" y="0"/>
+          <a:chExt cx="0" cy="0"/>
+        </a:xfrm>
+      </p:grpSpPr>
+      <p:sp>
+        <p:nvSpPr>
+          <p:cNvPr id="2" name="Tytuł 1">
+            <a:extLst>
+              <a:ext uri="{FF2B5EF4-FFF2-40B4-BE49-F238E27FC236}">
+                <a16:creationId xmlns:a16="http://schemas.microsoft.com/office/drawing/2014/main" id="{52BE09AA-579F-BF42-8567-BED4AC48D258}"/>
+              </a:ext>
+            </a:extLst>
+          </p:cNvPr>
+          <p:cNvSpPr>
+            <a:spLocks noGrp="1"/>
+          </p:cNvSpPr>
+          <p:nvPr>
+            <p:ph type="title"/>
+          </p:nvPr>
+        </p:nvSpPr>
+        <p:spPr/>
+        <p:txBody>
           <a:bodyPr/>
+          <a:lstStyle/>
+          <a:p>
+            <a:r>
+              <a:rPr lang="pl-PL" dirty="0"/>
+              <a:t>Przykład</a:t>
+            </a:r>
+          </a:p>
+        </p:txBody>
+      </p:sp>
+      <p:sp>
+        <p:nvSpPr>
+          <p:cNvPr id="3" name="Symbol zastępczy zawartości 2">
+            <a:extLst>
+              <a:ext uri="{FF2B5EF4-FFF2-40B4-BE49-F238E27FC236}">
+                <a16:creationId xmlns:a16="http://schemas.microsoft.com/office/drawing/2014/main" id="{D119E589-24AA-5444-99F6-8A471D69B6A4}"/>
+              </a:ext>
+            </a:extLst>
+          </p:cNvPr>
+          <p:cNvSpPr>
+            <a:spLocks noGrp="1"/>
+          </p:cNvSpPr>
+          <p:nvPr>
+            <p:ph idx="1"/>
+          </p:nvPr>
+        </p:nvSpPr>
+        <p:spPr/>
+        <p:txBody>
+          <a:bodyPr>
+            <a:normAutofit lnSpcReduction="10000"/>
+          </a:bodyPr>
           <a:lstStyle/>
           <a:p>
             <a:pPr marL="0" indent="0">
@@ -31187,23 +32458,6 @@
               <a:t> – utworzenie zmiennej globalnej x</a:t>
             </a:r>
             <a:endParaRPr lang="pl-PL" dirty="0"/>
-          </a:p>
-          <a:p>
-            <a:pPr marL="0" indent="0">
-              <a:buNone/>
-            </a:pPr>
-            <a:r>
-              <a:rPr lang="pl-PL" dirty="0"/>
-              <a:t>wypisz x </a:t>
-            </a:r>
-            <a:r>
-              <a:rPr lang="pl-PL" dirty="0">
-                <a:solidFill>
-                  <a:schemeClr val="accent1"/>
-                </a:solidFill>
-              </a:rPr>
-              <a:t>– program wypisze 10</a:t>
-            </a:r>
           </a:p>
           <a:p>
             <a:pPr marL="0" indent="0">
@@ -31255,12 +32509,84 @@
               <a:t>– program wypisze 5</a:t>
             </a:r>
           </a:p>
+          <a:p>
+            <a:pPr marL="0" indent="0">
+              <a:buNone/>
+            </a:pPr>
+            <a:endParaRPr lang="pl-PL" dirty="0">
+              <a:solidFill>
+                <a:schemeClr val="accent1"/>
+              </a:solidFill>
+            </a:endParaRPr>
+          </a:p>
+          <a:p>
+            <a:pPr marL="0" indent="0">
+              <a:buNone/>
+            </a:pPr>
+            <a:r>
+              <a:rPr lang="pl-PL" dirty="0"/>
+              <a:t>wypisz x </a:t>
+            </a:r>
+            <a:r>
+              <a:rPr lang="pl-PL" dirty="0">
+                <a:solidFill>
+                  <a:schemeClr val="accent1"/>
+                </a:solidFill>
+              </a:rPr>
+              <a:t>– program wypisze 10</a:t>
+            </a:r>
+          </a:p>
+          <a:p>
+            <a:pPr marL="0" indent="0">
+              <a:buNone/>
+            </a:pPr>
+            <a:r>
+              <a:rPr lang="pl-PL" dirty="0"/>
+              <a:t>wywołaj f() </a:t>
+            </a:r>
+            <a:r>
+              <a:rPr lang="pl-PL" dirty="0">
+                <a:solidFill>
+                  <a:schemeClr val="accent1"/>
+                </a:solidFill>
+              </a:rPr>
+              <a:t>– program wypisze 5</a:t>
+            </a:r>
+            <a:endParaRPr lang="pl-PL" dirty="0"/>
+          </a:p>
+          <a:p>
+            <a:pPr marL="0" indent="0">
+              <a:buNone/>
+            </a:pPr>
+            <a:r>
+              <a:rPr lang="pl-PL" dirty="0"/>
+              <a:t>wypisz x </a:t>
+            </a:r>
+            <a:r>
+              <a:rPr lang="pl-PL" dirty="0">
+                <a:solidFill>
+                  <a:schemeClr val="accent1"/>
+                </a:solidFill>
+              </a:rPr>
+              <a:t>– program wypisze 10</a:t>
+            </a:r>
+          </a:p>
+          <a:p>
+            <a:pPr marL="0" indent="0">
+              <a:buNone/>
+            </a:pPr>
+            <a:endParaRPr lang="pl-PL" dirty="0">
+              <a:solidFill>
+                <a:schemeClr val="accent1"/>
+              </a:solidFill>
+            </a:endParaRPr>
+          </a:p>
         </p:txBody>
       </p:sp>
     </p:spTree>
     <p:extLst>
       <p:ext uri="{BB962C8B-B14F-4D97-AF65-F5344CB8AC3E}">
-        <p14:creationId xmlns:p14="http://schemas.microsoft.com/office/powerpoint/2010/main" val="3585524554"/>
+        <p14:creationId xmlns:p14="http://schemas.microsoft.com/office/powerpoint/2010/main" val="2310387632"/>
       </p:ext>
     </p:extLst>
   </p:cSld>
@@ -31270,7 +32596,533 @@
 </p:sld>
 </file>
 
-<file path=ppt/slides/slide6.xml><?xml version="1.0" encoding="utf-8"?>
+<file path=ppt/slides/slide7.xml><?xml version="1.0" encoding="utf-8"?>
+<p:sld xmlns:a="http://schemas.openxmlformats.org/drawingml/2006/main" xmlns:r="http://schemas.openxmlformats.org/officeDocument/2006/relationships" xmlns:p="http://schemas.openxmlformats.org/presentationml/2006/main">
+  <p:cSld>
+    <p:spTree>
+      <p:nvGrpSpPr>
+        <p:cNvPr id="1" name=""/>
+        <p:cNvGrpSpPr/>
+        <p:nvPr/>
+      </p:nvGrpSpPr>
+      <p:grpSpPr>
+        <a:xfrm>
+          <a:off x="0" y="0"/>
+          <a:ext cx="0" cy="0"/>
+          <a:chOff x="0" y="0"/>
+          <a:chExt cx="0" cy="0"/>
+        </a:xfrm>
+      </p:grpSpPr>
+      <p:sp>
+        <p:nvSpPr>
+          <p:cNvPr id="2" name="Tytuł 1">
+            <a:extLst>
+              <a:ext uri="{FF2B5EF4-FFF2-40B4-BE49-F238E27FC236}">
+                <a16:creationId xmlns:a16="http://schemas.microsoft.com/office/drawing/2014/main" id="{52BE09AA-579F-BF42-8567-BED4AC48D258}"/>
+              </a:ext>
+            </a:extLst>
+          </p:cNvPr>
+          <p:cNvSpPr>
+            <a:spLocks noGrp="1"/>
+          </p:cNvSpPr>
+          <p:nvPr>
+            <p:ph type="title"/>
+          </p:nvPr>
+        </p:nvSpPr>
+        <p:spPr/>
+        <p:txBody>
+          <a:bodyPr/>
+          <a:lstStyle/>
+          <a:p>
+            <a:r>
+              <a:rPr lang="pl-PL" dirty="0"/>
+              <a:t>Przykład</a:t>
+            </a:r>
+          </a:p>
+        </p:txBody>
+      </p:sp>
+      <p:sp>
+        <p:nvSpPr>
+          <p:cNvPr id="3" name="Symbol zastępczy zawartości 2">
+            <a:extLst>
+              <a:ext uri="{FF2B5EF4-FFF2-40B4-BE49-F238E27FC236}">
+                <a16:creationId xmlns:a16="http://schemas.microsoft.com/office/drawing/2014/main" id="{D119E589-24AA-5444-99F6-8A471D69B6A4}"/>
+              </a:ext>
+            </a:extLst>
+          </p:cNvPr>
+          <p:cNvSpPr>
+            <a:spLocks noGrp="1"/>
+          </p:cNvSpPr>
+          <p:nvPr>
+            <p:ph idx="1"/>
+          </p:nvPr>
+        </p:nvSpPr>
+        <p:spPr/>
+        <p:txBody>
+          <a:bodyPr>
+            <a:normAutofit lnSpcReduction="10000"/>
+          </a:bodyPr>
+          <a:lstStyle/>
+          <a:p>
+            <a:pPr marL="0" indent="0">
+              <a:buNone/>
+            </a:pPr>
+            <a:r>
+              <a:rPr lang="pl-PL" dirty="0"/>
+              <a:t>zmienna x = 10</a:t>
+            </a:r>
+          </a:p>
+          <a:p>
+            <a:pPr marL="0" indent="0">
+              <a:buNone/>
+            </a:pPr>
+            <a:endParaRPr lang="pl-PL" dirty="0"/>
+          </a:p>
+          <a:p>
+            <a:pPr marL="0" indent="0">
+              <a:buNone/>
+            </a:pPr>
+            <a:r>
+              <a:rPr lang="pl-PL" dirty="0"/>
+              <a:t>funkcja f():</a:t>
+            </a:r>
+          </a:p>
+          <a:p>
+            <a:pPr marL="0" indent="0">
+              <a:buNone/>
+            </a:pPr>
+            <a:r>
+              <a:rPr lang="pl-PL" dirty="0"/>
+              <a:t>	zmienna x = 5</a:t>
+            </a:r>
+          </a:p>
+          <a:p>
+            <a:pPr marL="0" indent="0">
+              <a:buNone/>
+            </a:pPr>
+            <a:r>
+              <a:rPr lang="pl-PL" dirty="0"/>
+              <a:t>	wypisz x</a:t>
+            </a:r>
+            <a:endParaRPr lang="pl-PL" dirty="0">
+              <a:solidFill>
+                <a:schemeClr val="accent1"/>
+              </a:solidFill>
+            </a:endParaRPr>
+          </a:p>
+          <a:p>
+            <a:pPr marL="0" indent="0">
+              <a:buNone/>
+            </a:pPr>
+            <a:endParaRPr lang="pl-PL" dirty="0">
+              <a:solidFill>
+                <a:schemeClr val="accent1"/>
+              </a:solidFill>
+            </a:endParaRPr>
+          </a:p>
+          <a:p>
+            <a:pPr marL="0" indent="0">
+              <a:buNone/>
+            </a:pPr>
+            <a:r>
+              <a:rPr lang="pl-PL" dirty="0"/>
+              <a:t>wypisz x</a:t>
+            </a:r>
+            <a:endParaRPr lang="pl-PL" dirty="0">
+              <a:solidFill>
+                <a:schemeClr val="accent1"/>
+              </a:solidFill>
+            </a:endParaRPr>
+          </a:p>
+          <a:p>
+            <a:pPr marL="0" indent="0">
+              <a:buNone/>
+            </a:pPr>
+            <a:r>
+              <a:rPr lang="pl-PL" dirty="0"/>
+              <a:t>wywołaj f()</a:t>
+            </a:r>
+          </a:p>
+          <a:p>
+            <a:pPr marL="0" indent="0">
+              <a:buNone/>
+            </a:pPr>
+            <a:r>
+              <a:rPr lang="pl-PL" dirty="0"/>
+              <a:t>wypisz x</a:t>
+            </a:r>
+            <a:endParaRPr lang="pl-PL" dirty="0">
+              <a:solidFill>
+                <a:schemeClr val="accent1"/>
+              </a:solidFill>
+            </a:endParaRPr>
+          </a:p>
+          <a:p>
+            <a:pPr marL="0" indent="0">
+              <a:buNone/>
+            </a:pPr>
+            <a:endParaRPr lang="pl-PL" dirty="0">
+              <a:solidFill>
+                <a:schemeClr val="accent1"/>
+              </a:solidFill>
+            </a:endParaRPr>
+          </a:p>
+        </p:txBody>
+      </p:sp>
+      <p:sp>
+        <p:nvSpPr>
+          <p:cNvPr id="5" name="Nawias klamrowy zamykający 4">
+            <a:extLst>
+              <a:ext uri="{FF2B5EF4-FFF2-40B4-BE49-F238E27FC236}">
+                <a16:creationId xmlns:a16="http://schemas.microsoft.com/office/drawing/2014/main" id="{252E8FEE-55C7-224C-9CCD-3375AB56A314}"/>
+              </a:ext>
+            </a:extLst>
+          </p:cNvPr>
+          <p:cNvSpPr/>
+          <p:nvPr/>
+        </p:nvSpPr>
+        <p:spPr>
+          <a:xfrm>
+            <a:off x="6939828" y="1690688"/>
+            <a:ext cx="1119883" cy="4304871"/>
+          </a:xfrm>
+          <a:prstGeom prst="rightBrace">
+            <a:avLst/>
+          </a:prstGeom>
+          <a:ln w="38100"/>
+        </p:spPr>
+        <p:style>
+          <a:lnRef idx="1">
+            <a:schemeClr val="accent1"/>
+          </a:lnRef>
+          <a:fillRef idx="0">
+            <a:schemeClr val="accent1"/>
+          </a:fillRef>
+          <a:effectRef idx="0">
+            <a:schemeClr val="accent1"/>
+          </a:effectRef>
+          <a:fontRef idx="minor">
+            <a:schemeClr val="tx1"/>
+          </a:fontRef>
+        </p:style>
+        <p:txBody>
+          <a:bodyPr rtlCol="0" anchor="ctr"/>
+          <a:lstStyle/>
+          <a:p>
+            <a:pPr algn="ctr"/>
+            <a:endParaRPr lang="pl-PL"/>
+          </a:p>
+        </p:txBody>
+      </p:sp>
+      <p:sp>
+        <p:nvSpPr>
+          <p:cNvPr id="6" name="Prostokąt 5">
+            <a:extLst>
+              <a:ext uri="{FF2B5EF4-FFF2-40B4-BE49-F238E27FC236}">
+                <a16:creationId xmlns:a16="http://schemas.microsoft.com/office/drawing/2014/main" id="{EFC287B2-4463-B54B-8E83-8E1B59C5DBA9}"/>
+              </a:ext>
+            </a:extLst>
+          </p:cNvPr>
+          <p:cNvSpPr/>
+          <p:nvPr/>
+        </p:nvSpPr>
+        <p:spPr>
+          <a:xfrm>
+            <a:off x="8059711" y="2965960"/>
+            <a:ext cx="2946961" cy="1754326"/>
+          </a:xfrm>
+          <a:prstGeom prst="rect">
+            <a:avLst/>
+          </a:prstGeom>
+          <a:noFill/>
+        </p:spPr>
+        <p:txBody>
+          <a:bodyPr wrap="none" lIns="91440" tIns="45720" rIns="91440" bIns="45720">
+            <a:spAutoFit/>
+          </a:bodyPr>
+          <a:lstStyle/>
+          <a:p>
+            <a:pPr algn="ctr"/>
+            <a:r>
+              <a:rPr lang="pl-PL" sz="5400" b="0" cap="none" spc="0" dirty="0">
+                <a:ln w="0"/>
+                <a:solidFill>
+                  <a:schemeClr val="tx1"/>
+                </a:solidFill>
+                <a:effectLst>
+                  <a:outerShdw blurRad="38100" dist="19050" dir="2700000" algn="tl" rotWithShape="0">
+                    <a:schemeClr val="dk1">
+                      <a:alpha val="40000"/>
+                    </a:schemeClr>
+                  </a:outerShdw>
+                </a:effectLst>
+              </a:rPr>
+              <a:t>Kontekst</a:t>
+            </a:r>
+            <a:br>
+              <a:rPr lang="pl-PL" sz="5400" b="0" cap="none" spc="0" dirty="0">
+                <a:ln w="0"/>
+                <a:solidFill>
+                  <a:schemeClr val="tx1"/>
+                </a:solidFill>
+                <a:effectLst>
+                  <a:outerShdw blurRad="38100" dist="19050" dir="2700000" algn="tl" rotWithShape="0">
+                    <a:schemeClr val="dk1">
+                      <a:alpha val="40000"/>
+                    </a:schemeClr>
+                  </a:outerShdw>
+                </a:effectLst>
+              </a:rPr>
+            </a:br>
+            <a:r>
+              <a:rPr lang="pl-PL" sz="5400" b="0" cap="none" spc="0" dirty="0">
+                <a:ln w="0"/>
+                <a:solidFill>
+                  <a:schemeClr val="tx1"/>
+                </a:solidFill>
+                <a:effectLst>
+                  <a:outerShdw blurRad="38100" dist="19050" dir="2700000" algn="tl" rotWithShape="0">
+                    <a:schemeClr val="dk1">
+                      <a:alpha val="40000"/>
+                    </a:schemeClr>
+                  </a:outerShdw>
+                </a:effectLst>
+              </a:rPr>
+              <a:t>programu</a:t>
+            </a:r>
+          </a:p>
+        </p:txBody>
+      </p:sp>
+      <p:sp>
+        <p:nvSpPr>
+          <p:cNvPr id="7" name="Nawias klamrowy zamykający 6">
+            <a:extLst>
+              <a:ext uri="{FF2B5EF4-FFF2-40B4-BE49-F238E27FC236}">
+                <a16:creationId xmlns:a16="http://schemas.microsoft.com/office/drawing/2014/main" id="{2657FB27-777C-0445-9AFE-4B5F947DBB02}"/>
+              </a:ext>
+            </a:extLst>
+          </p:cNvPr>
+          <p:cNvSpPr/>
+          <p:nvPr/>
+        </p:nvSpPr>
+        <p:spPr>
+          <a:xfrm>
+            <a:off x="3738081" y="3113070"/>
+            <a:ext cx="1119883" cy="1140431"/>
+          </a:xfrm>
+          <a:prstGeom prst="rightBrace">
+            <a:avLst/>
+          </a:prstGeom>
+          <a:ln w="38100"/>
+        </p:spPr>
+        <p:style>
+          <a:lnRef idx="1">
+            <a:schemeClr val="accent1"/>
+          </a:lnRef>
+          <a:fillRef idx="0">
+            <a:schemeClr val="accent1"/>
+          </a:fillRef>
+          <a:effectRef idx="0">
+            <a:schemeClr val="accent1"/>
+          </a:effectRef>
+          <a:fontRef idx="minor">
+            <a:schemeClr val="tx1"/>
+          </a:fontRef>
+        </p:style>
+        <p:txBody>
+          <a:bodyPr rtlCol="0" anchor="ctr"/>
+          <a:lstStyle/>
+          <a:p>
+            <a:pPr algn="ctr"/>
+            <a:endParaRPr lang="pl-PL"/>
+          </a:p>
+        </p:txBody>
+      </p:sp>
+      <p:sp>
+        <p:nvSpPr>
+          <p:cNvPr id="8" name="Prostokąt 7">
+            <a:extLst>
+              <a:ext uri="{FF2B5EF4-FFF2-40B4-BE49-F238E27FC236}">
+                <a16:creationId xmlns:a16="http://schemas.microsoft.com/office/drawing/2014/main" id="{5D14F948-6FC5-6C48-9114-84D2C197DDB4}"/>
+              </a:ext>
+            </a:extLst>
+          </p:cNvPr>
+          <p:cNvSpPr/>
+          <p:nvPr/>
+        </p:nvSpPr>
+        <p:spPr>
+          <a:xfrm>
+            <a:off x="4780794" y="3113070"/>
+            <a:ext cx="1811906" cy="1200329"/>
+          </a:xfrm>
+          <a:prstGeom prst="rect">
+            <a:avLst/>
+          </a:prstGeom>
+          <a:noFill/>
+        </p:spPr>
+        <p:txBody>
+          <a:bodyPr wrap="none" lIns="91440" tIns="45720" rIns="91440" bIns="45720">
+            <a:spAutoFit/>
+          </a:bodyPr>
+          <a:lstStyle/>
+          <a:p>
+            <a:pPr algn="ctr"/>
+            <a:r>
+              <a:rPr lang="pl-PL" sz="3600" b="0" cap="none" spc="0" dirty="0">
+                <a:ln w="0"/>
+                <a:solidFill>
+                  <a:schemeClr val="tx1"/>
+                </a:solidFill>
+                <a:effectLst>
+                  <a:outerShdw blurRad="38100" dist="19050" dir="2700000" algn="tl" rotWithShape="0">
+                    <a:schemeClr val="dk1">
+                      <a:alpha val="40000"/>
+                    </a:schemeClr>
+                  </a:outerShdw>
+                </a:effectLst>
+              </a:rPr>
+              <a:t>Kontekst</a:t>
+            </a:r>
+            <a:br>
+              <a:rPr lang="pl-PL" sz="3600" b="0" cap="none" spc="0" dirty="0">
+                <a:ln w="0"/>
+                <a:solidFill>
+                  <a:schemeClr val="tx1"/>
+                </a:solidFill>
+                <a:effectLst>
+                  <a:outerShdw blurRad="38100" dist="19050" dir="2700000" algn="tl" rotWithShape="0">
+                    <a:schemeClr val="dk1">
+                      <a:alpha val="40000"/>
+                    </a:schemeClr>
+                  </a:outerShdw>
+                </a:effectLst>
+              </a:rPr>
+            </a:br>
+            <a:r>
+              <a:rPr lang="pl-PL" sz="3600" b="0" cap="none" spc="0" dirty="0">
+                <a:ln w="0"/>
+                <a:solidFill>
+                  <a:schemeClr val="tx1"/>
+                </a:solidFill>
+                <a:effectLst>
+                  <a:outerShdw blurRad="38100" dist="19050" dir="2700000" algn="tl" rotWithShape="0">
+                    <a:schemeClr val="dk1">
+                      <a:alpha val="40000"/>
+                    </a:schemeClr>
+                  </a:outerShdw>
+                </a:effectLst>
+              </a:rPr>
+              <a:t>funkcji</a:t>
+            </a:r>
+          </a:p>
+        </p:txBody>
+      </p:sp>
+    </p:spTree>
+    <p:extLst>
+      <p:ext uri="{BB962C8B-B14F-4D97-AF65-F5344CB8AC3E}">
+        <p14:creationId xmlns:p14="http://schemas.microsoft.com/office/powerpoint/2010/main" val="2467692942"/>
+      </p:ext>
+    </p:extLst>
+  </p:cSld>
+  <p:clrMapOvr>
+    <a:masterClrMapping/>
+  </p:clrMapOvr>
+</p:sld>
+</file>
+
+<file path=ppt/slides/slide8.xml><?xml version="1.0" encoding="utf-8"?>
+<p:sld xmlns:a="http://schemas.openxmlformats.org/drawingml/2006/main" xmlns:r="http://schemas.openxmlformats.org/officeDocument/2006/relationships" xmlns:p="http://schemas.openxmlformats.org/presentationml/2006/main">
+  <p:cSld>
+    <p:spTree>
+      <p:nvGrpSpPr>
+        <p:cNvPr id="1" name=""/>
+        <p:cNvGrpSpPr/>
+        <p:nvPr/>
+      </p:nvGrpSpPr>
+      <p:grpSpPr>
+        <a:xfrm>
+          <a:off x="0" y="0"/>
+          <a:ext cx="0" cy="0"/>
+          <a:chOff x="0" y="0"/>
+          <a:chExt cx="0" cy="0"/>
+        </a:xfrm>
+      </p:grpSpPr>
+      <p:sp>
+        <p:nvSpPr>
+          <p:cNvPr id="2" name="Tytuł 1">
+            <a:extLst>
+              <a:ext uri="{FF2B5EF4-FFF2-40B4-BE49-F238E27FC236}">
+                <a16:creationId xmlns:a16="http://schemas.microsoft.com/office/drawing/2014/main" id="{E4C4D3C8-DA8D-3146-B76E-BFEFABEA11D2}"/>
+              </a:ext>
+            </a:extLst>
+          </p:cNvPr>
+          <p:cNvSpPr>
+            <a:spLocks noGrp="1"/>
+          </p:cNvSpPr>
+          <p:nvPr>
+            <p:ph type="title"/>
+          </p:nvPr>
+        </p:nvSpPr>
+        <p:spPr/>
+        <p:txBody>
+          <a:bodyPr/>
+          <a:lstStyle/>
+          <a:p>
+            <a:r>
+              <a:rPr lang="pl-PL" dirty="0"/>
+              <a:t>Przykład</a:t>
+            </a:r>
+          </a:p>
+        </p:txBody>
+      </p:sp>
+      <p:sp>
+        <p:nvSpPr>
+          <p:cNvPr id="3" name="Symbol zastępczy zawartości 2">
+            <a:extLst>
+              <a:ext uri="{FF2B5EF4-FFF2-40B4-BE49-F238E27FC236}">
+                <a16:creationId xmlns:a16="http://schemas.microsoft.com/office/drawing/2014/main" id="{722AB40F-A207-2F4B-A1F5-296FC150B90D}"/>
+              </a:ext>
+            </a:extLst>
+          </p:cNvPr>
+          <p:cNvSpPr>
+            <a:spLocks noGrp="1"/>
+          </p:cNvSpPr>
+          <p:nvPr>
+            <p:ph idx="1"/>
+          </p:nvPr>
+        </p:nvSpPr>
+        <p:spPr/>
+        <p:txBody>
+          <a:bodyPr/>
+          <a:lstStyle/>
+          <a:p>
+            <a:r>
+              <a:rPr lang="pl-PL" dirty="0"/>
+              <a:t>[Poszukiwanie zmiennej w różnych kontekstach]</a:t>
+            </a:r>
+          </a:p>
+          <a:p>
+            <a:r>
+              <a:rPr lang="pl-PL" dirty="0"/>
+              <a:t>[Np. zmienna x – globalna, zmienna y – lokalna wewnątrz funkcji]</a:t>
+            </a:r>
+          </a:p>
+        </p:txBody>
+      </p:sp>
+    </p:spTree>
+    <p:extLst>
+      <p:ext uri="{BB962C8B-B14F-4D97-AF65-F5344CB8AC3E}">
+        <p14:creationId xmlns:p14="http://schemas.microsoft.com/office/powerpoint/2010/main" val="766362664"/>
+      </p:ext>
+    </p:extLst>
+  </p:cSld>
+  <p:clrMapOvr>
+    <a:masterClrMapping/>
+  </p:clrMapOvr>
+</p:sld>
+</file>
+
+<file path=ppt/slides/slide9.xml><?xml version="1.0" encoding="utf-8"?>
 <p:sld xmlns:a="http://schemas.openxmlformats.org/drawingml/2006/main" xmlns:r="http://schemas.openxmlformats.org/officeDocument/2006/relationships" xmlns:p="http://schemas.openxmlformats.org/presentationml/2006/main">
   <p:cSld>
     <p:spTree>
@@ -31359,1086 +33211,6 @@
     <p:extLst>
       <p:ext uri="{BB962C8B-B14F-4D97-AF65-F5344CB8AC3E}">
         <p14:creationId xmlns:p14="http://schemas.microsoft.com/office/powerpoint/2010/main" val="334770080"/>
-      </p:ext>
-    </p:extLst>
-  </p:cSld>
-  <p:clrMapOvr>
-    <a:masterClrMapping/>
-  </p:clrMapOvr>
-</p:sld>
-</file>
-
-<file path=ppt/slides/slide7.xml><?xml version="1.0" encoding="utf-8"?>
-<p:sld xmlns:a="http://schemas.openxmlformats.org/drawingml/2006/main" xmlns:r="http://schemas.openxmlformats.org/officeDocument/2006/relationships" xmlns:p="http://schemas.openxmlformats.org/presentationml/2006/main">
-  <p:cSld>
-    <p:spTree>
-      <p:nvGrpSpPr>
-        <p:cNvPr id="1" name=""/>
-        <p:cNvGrpSpPr/>
-        <p:nvPr/>
-      </p:nvGrpSpPr>
-      <p:grpSpPr>
-        <a:xfrm>
-          <a:off x="0" y="0"/>
-          <a:ext cx="0" cy="0"/>
-          <a:chOff x="0" y="0"/>
-          <a:chExt cx="0" cy="0"/>
-        </a:xfrm>
-      </p:grpSpPr>
-      <p:sp>
-        <p:nvSpPr>
-          <p:cNvPr id="2" name="Tytuł 1">
-            <a:extLst>
-              <a:ext uri="{FF2B5EF4-FFF2-40B4-BE49-F238E27FC236}">
-                <a16:creationId xmlns:a16="http://schemas.microsoft.com/office/drawing/2014/main" id="{ABC53672-EF4B-4831-9E38-12951B158619}"/>
-              </a:ext>
-            </a:extLst>
-          </p:cNvPr>
-          <p:cNvSpPr>
-            <a:spLocks noGrp="1"/>
-          </p:cNvSpPr>
-          <p:nvPr>
-            <p:ph type="title"/>
-          </p:nvPr>
-        </p:nvSpPr>
-        <p:spPr/>
-        <p:txBody>
-          <a:bodyPr/>
-          <a:lstStyle/>
-          <a:p>
-            <a:r>
-              <a:rPr lang="pl-PL" dirty="0"/>
-              <a:t>Przykład</a:t>
-            </a:r>
-          </a:p>
-        </p:txBody>
-      </p:sp>
-      <p:grpSp>
-        <p:nvGrpSpPr>
-          <p:cNvPr id="8" name="Grupa 7">
-            <a:extLst>
-              <a:ext uri="{FF2B5EF4-FFF2-40B4-BE49-F238E27FC236}">
-                <a16:creationId xmlns:a16="http://schemas.microsoft.com/office/drawing/2014/main" id="{91FDE43D-B8A5-4B93-9EE3-2ED73D1D903B}"/>
-              </a:ext>
-            </a:extLst>
-          </p:cNvPr>
-          <p:cNvGrpSpPr/>
-          <p:nvPr/>
-        </p:nvGrpSpPr>
-        <p:grpSpPr>
-          <a:xfrm>
-            <a:off x="0" y="1892182"/>
-            <a:ext cx="6316070" cy="3429922"/>
-            <a:chOff x="0" y="1892182"/>
-            <a:chExt cx="6316070" cy="3429922"/>
-          </a:xfrm>
-        </p:grpSpPr>
-        <p:graphicFrame>
-          <p:nvGraphicFramePr>
-            <p:cNvPr id="4" name="Diagram 3">
-              <a:extLst>
-                <a:ext uri="{FF2B5EF4-FFF2-40B4-BE49-F238E27FC236}">
-                  <a16:creationId xmlns:a16="http://schemas.microsoft.com/office/drawing/2014/main" id="{04D11AEF-FB9A-4BD3-ABC4-0314E8D30E30}"/>
-                </a:ext>
-              </a:extLst>
-            </p:cNvPr>
-            <p:cNvGraphicFramePr/>
-            <p:nvPr>
-              <p:extLst>
-                <p:ext uri="{D42A27DB-BD31-4B8C-83A1-F6EECF244321}">
-                  <p14:modId xmlns:p14="http://schemas.microsoft.com/office/powerpoint/2010/main" val="3781479862"/>
-                </p:ext>
-              </p:extLst>
-            </p:nvPr>
-          </p:nvGraphicFramePr>
-          <p:xfrm>
-            <a:off x="0" y="1892182"/>
-            <a:ext cx="6316070" cy="3429922"/>
-          </p:xfrm>
-          <a:graphic>
-            <a:graphicData uri="http://schemas.openxmlformats.org/drawingml/2006/diagram">
-              <dgm:relIds xmlns:dgm="http://schemas.openxmlformats.org/drawingml/2006/diagram" xmlns:r="http://schemas.openxmlformats.org/officeDocument/2006/relationships" r:dm="rId2" r:lo="rId3" r:qs="rId4" r:cs="rId5"/>
-            </a:graphicData>
-          </a:graphic>
-        </p:graphicFrame>
-        <p:pic>
-          <p:nvPicPr>
-            <p:cNvPr id="5" name="Obraz 4" descr="Obraz zawierający tekst, znak&#10;&#10;Opis wygenerowany przy wysokim poziomie pewności">
-              <a:extLst>
-                <a:ext uri="{FF2B5EF4-FFF2-40B4-BE49-F238E27FC236}">
-                  <a16:creationId xmlns:a16="http://schemas.microsoft.com/office/drawing/2014/main" id="{8475C1EA-C10C-46AC-B2ED-21E16000A1ED}"/>
-                </a:ext>
-              </a:extLst>
-            </p:cNvPr>
-            <p:cNvPicPr>
-              <a:picLocks noChangeAspect="1"/>
-            </p:cNvPicPr>
-            <p:nvPr/>
-          </p:nvPicPr>
-          <p:blipFill>
-            <a:blip r:embed="rId7">
-              <a:extLst>
-                <a:ext uri="{837473B0-CC2E-450A-ABE3-18F120FF3D39}">
-                  <a1611:picAttrSrcUrl xmlns:a1611="http://schemas.microsoft.com/office/drawing/2016/11/main" r:id="rId8"/>
-                </a:ext>
-              </a:extLst>
-            </a:blip>
-            <a:stretch>
-              <a:fillRect/>
-            </a:stretch>
-          </p:blipFill>
-          <p:spPr>
-            <a:xfrm>
-              <a:off x="1997397" y="3762595"/>
-              <a:ext cx="376272" cy="376272"/>
-            </a:xfrm>
-            <a:prstGeom prst="rect">
-              <a:avLst/>
-            </a:prstGeom>
-          </p:spPr>
-        </p:pic>
-        <p:pic>
-          <p:nvPicPr>
-            <p:cNvPr id="6" name="Obraz 5">
-              <a:extLst>
-                <a:ext uri="{FF2B5EF4-FFF2-40B4-BE49-F238E27FC236}">
-                  <a16:creationId xmlns:a16="http://schemas.microsoft.com/office/drawing/2014/main" id="{67DD1412-5BB4-413D-B915-E4F0F76688DC}"/>
-                </a:ext>
-              </a:extLst>
-            </p:cNvPr>
-            <p:cNvPicPr>
-              <a:picLocks noChangeAspect="1"/>
-            </p:cNvPicPr>
-            <p:nvPr/>
-          </p:nvPicPr>
-          <p:blipFill>
-            <a:blip r:embed="rId9">
-              <a:extLst>
-                <a:ext uri="{837473B0-CC2E-450A-ABE3-18F120FF3D39}">
-                  <a1611:picAttrSrcUrl xmlns:a1611="http://schemas.microsoft.com/office/drawing/2016/11/main" r:id="rId10"/>
-                </a:ext>
-              </a:extLst>
-            </a:blip>
-            <a:stretch>
-              <a:fillRect/>
-            </a:stretch>
-          </p:blipFill>
-          <p:spPr>
-            <a:xfrm>
-              <a:off x="1966412" y="4152225"/>
-              <a:ext cx="438242" cy="438242"/>
-            </a:xfrm>
-            <a:prstGeom prst="rect">
-              <a:avLst/>
-            </a:prstGeom>
-          </p:spPr>
-        </p:pic>
-        <p:pic>
-          <p:nvPicPr>
-            <p:cNvPr id="7" name="Obraz 6" descr="Obraz zawierający niebo, zewnętrzne&#10;&#10;Opis wygenerowany przy wysokim poziomie pewności">
-              <a:extLst>
-                <a:ext uri="{FF2B5EF4-FFF2-40B4-BE49-F238E27FC236}">
-                  <a16:creationId xmlns:a16="http://schemas.microsoft.com/office/drawing/2014/main" id="{B03B6076-4E2B-4170-9D2A-44DEB55DE0F1}"/>
-                </a:ext>
-              </a:extLst>
-            </p:cNvPr>
-            <p:cNvPicPr>
-              <a:picLocks noChangeAspect="1"/>
-            </p:cNvPicPr>
-            <p:nvPr/>
-          </p:nvPicPr>
-          <p:blipFill>
-            <a:blip r:embed="rId11"/>
-            <a:stretch>
-              <a:fillRect/>
-            </a:stretch>
-          </p:blipFill>
-          <p:spPr>
-            <a:xfrm>
-              <a:off x="1373795" y="4530286"/>
-              <a:ext cx="1685446" cy="666278"/>
-            </a:xfrm>
-            <a:prstGeom prst="rect">
-              <a:avLst/>
-            </a:prstGeom>
-          </p:spPr>
-        </p:pic>
-      </p:grpSp>
-      <p:grpSp>
-        <p:nvGrpSpPr>
-          <p:cNvPr id="19" name="Grupa 18">
-            <a:extLst>
-              <a:ext uri="{FF2B5EF4-FFF2-40B4-BE49-F238E27FC236}">
-                <a16:creationId xmlns:a16="http://schemas.microsoft.com/office/drawing/2014/main" id="{B86586E8-A692-40A3-AAA2-89430CF42645}"/>
-              </a:ext>
-            </a:extLst>
-          </p:cNvPr>
-          <p:cNvGrpSpPr/>
-          <p:nvPr/>
-        </p:nvGrpSpPr>
-        <p:grpSpPr>
-          <a:xfrm>
-            <a:off x="5739468" y="1892182"/>
-            <a:ext cx="6316070" cy="3429922"/>
-            <a:chOff x="0" y="1892182"/>
-            <a:chExt cx="6316070" cy="3429922"/>
-          </a:xfrm>
-        </p:grpSpPr>
-        <p:graphicFrame>
-          <p:nvGraphicFramePr>
-            <p:cNvPr id="20" name="Diagram 19">
-              <a:extLst>
-                <a:ext uri="{FF2B5EF4-FFF2-40B4-BE49-F238E27FC236}">
-                  <a16:creationId xmlns:a16="http://schemas.microsoft.com/office/drawing/2014/main" id="{8B4C87CF-B829-442E-8344-46F3882E34BD}"/>
-                </a:ext>
-              </a:extLst>
-            </p:cNvPr>
-            <p:cNvGraphicFramePr/>
-            <p:nvPr>
-              <p:extLst>
-                <p:ext uri="{D42A27DB-BD31-4B8C-83A1-F6EECF244321}">
-                  <p14:modId xmlns:p14="http://schemas.microsoft.com/office/powerpoint/2010/main" val="1895254172"/>
-                </p:ext>
-              </p:extLst>
-            </p:nvPr>
-          </p:nvGraphicFramePr>
-          <p:xfrm>
-            <a:off x="0" y="1892182"/>
-            <a:ext cx="6316070" cy="3429922"/>
-          </p:xfrm>
-          <a:graphic>
-            <a:graphicData uri="http://schemas.openxmlformats.org/drawingml/2006/diagram">
-              <dgm:relIds xmlns:dgm="http://schemas.openxmlformats.org/drawingml/2006/diagram" xmlns:r="http://schemas.openxmlformats.org/officeDocument/2006/relationships" r:dm="rId12" r:lo="rId13" r:qs="rId14" r:cs="rId15"/>
-            </a:graphicData>
-          </a:graphic>
-        </p:graphicFrame>
-        <p:pic>
-          <p:nvPicPr>
-            <p:cNvPr id="21" name="Obraz 20" descr="Obraz zawierający tekst, znak&#10;&#10;Opis wygenerowany przy wysokim poziomie pewności">
-              <a:extLst>
-                <a:ext uri="{FF2B5EF4-FFF2-40B4-BE49-F238E27FC236}">
-                  <a16:creationId xmlns:a16="http://schemas.microsoft.com/office/drawing/2014/main" id="{1800C2A6-D8A6-4293-8186-C6C34AE7354A}"/>
-                </a:ext>
-              </a:extLst>
-            </p:cNvPr>
-            <p:cNvPicPr>
-              <a:picLocks noChangeAspect="1"/>
-            </p:cNvPicPr>
-            <p:nvPr/>
-          </p:nvPicPr>
-          <p:blipFill>
-            <a:blip r:embed="rId7">
-              <a:extLst>
-                <a:ext uri="{837473B0-CC2E-450A-ABE3-18F120FF3D39}">
-                  <a1611:picAttrSrcUrl xmlns:a1611="http://schemas.microsoft.com/office/drawing/2016/11/main" r:id="rId8"/>
-                </a:ext>
-              </a:extLst>
-            </a:blip>
-            <a:stretch>
-              <a:fillRect/>
-            </a:stretch>
-          </p:blipFill>
-          <p:spPr>
-            <a:xfrm>
-              <a:off x="1932832" y="3762595"/>
-              <a:ext cx="376272" cy="376272"/>
-            </a:xfrm>
-            <a:prstGeom prst="rect">
-              <a:avLst/>
-            </a:prstGeom>
-          </p:spPr>
-        </p:pic>
-        <p:pic>
-          <p:nvPicPr>
-            <p:cNvPr id="22" name="Obraz 21">
-              <a:extLst>
-                <a:ext uri="{FF2B5EF4-FFF2-40B4-BE49-F238E27FC236}">
-                  <a16:creationId xmlns:a16="http://schemas.microsoft.com/office/drawing/2014/main" id="{593AD937-1EA8-41D0-B54E-A5DA7BFBFA0D}"/>
-                </a:ext>
-              </a:extLst>
-            </p:cNvPr>
-            <p:cNvPicPr>
-              <a:picLocks noChangeAspect="1"/>
-            </p:cNvPicPr>
-            <p:nvPr/>
-          </p:nvPicPr>
-          <p:blipFill>
-            <a:blip r:embed="rId9">
-              <a:extLst>
-                <a:ext uri="{837473B0-CC2E-450A-ABE3-18F120FF3D39}">
-                  <a1611:picAttrSrcUrl xmlns:a1611="http://schemas.microsoft.com/office/drawing/2016/11/main" r:id="rId10"/>
-                </a:ext>
-              </a:extLst>
-            </a:blip>
-            <a:stretch>
-              <a:fillRect/>
-            </a:stretch>
-          </p:blipFill>
-          <p:spPr>
-            <a:xfrm>
-              <a:off x="1895820" y="4152225"/>
-              <a:ext cx="438242" cy="438242"/>
-            </a:xfrm>
-            <a:prstGeom prst="rect">
-              <a:avLst/>
-            </a:prstGeom>
-          </p:spPr>
-        </p:pic>
-        <p:pic>
-          <p:nvPicPr>
-            <p:cNvPr id="23" name="Obraz 22" descr="Obraz zawierający niebo, zewnętrzne&#10;&#10;Opis wygenerowany przy wysokim poziomie pewności">
-              <a:extLst>
-                <a:ext uri="{FF2B5EF4-FFF2-40B4-BE49-F238E27FC236}">
-                  <a16:creationId xmlns:a16="http://schemas.microsoft.com/office/drawing/2014/main" id="{92167F14-F089-4F24-981A-2919931C0AEA}"/>
-                </a:ext>
-              </a:extLst>
-            </p:cNvPr>
-            <p:cNvPicPr>
-              <a:picLocks noChangeAspect="1"/>
-            </p:cNvPicPr>
-            <p:nvPr/>
-          </p:nvPicPr>
-          <p:blipFill>
-            <a:blip r:embed="rId11"/>
-            <a:stretch>
-              <a:fillRect/>
-            </a:stretch>
-          </p:blipFill>
-          <p:spPr>
-            <a:xfrm>
-              <a:off x="1278245" y="4530286"/>
-              <a:ext cx="1685446" cy="666278"/>
-            </a:xfrm>
-            <a:prstGeom prst="rect">
-              <a:avLst/>
-            </a:prstGeom>
-          </p:spPr>
-        </p:pic>
-      </p:grpSp>
-    </p:spTree>
-    <p:extLst>
-      <p:ext uri="{BB962C8B-B14F-4D97-AF65-F5344CB8AC3E}">
-        <p14:creationId xmlns:p14="http://schemas.microsoft.com/office/powerpoint/2010/main" val="4061770306"/>
-      </p:ext>
-    </p:extLst>
-  </p:cSld>
-  <p:clrMapOvr>
-    <a:masterClrMapping/>
-  </p:clrMapOvr>
-</p:sld>
-</file>
-
-<file path=ppt/slides/slide8.xml><?xml version="1.0" encoding="utf-8"?>
-<p:sld xmlns:a="http://schemas.openxmlformats.org/drawingml/2006/main" xmlns:r="http://schemas.openxmlformats.org/officeDocument/2006/relationships" xmlns:p="http://schemas.openxmlformats.org/presentationml/2006/main">
-  <p:cSld>
-    <p:spTree>
-      <p:nvGrpSpPr>
-        <p:cNvPr id="1" name=""/>
-        <p:cNvGrpSpPr/>
-        <p:nvPr/>
-      </p:nvGrpSpPr>
-      <p:grpSpPr>
-        <a:xfrm>
-          <a:off x="0" y="0"/>
-          <a:ext cx="0" cy="0"/>
-          <a:chOff x="0" y="0"/>
-          <a:chExt cx="0" cy="0"/>
-        </a:xfrm>
-      </p:grpSpPr>
-      <p:sp>
-        <p:nvSpPr>
-          <p:cNvPr id="2" name="Tytuł 1">
-            <a:extLst>
-              <a:ext uri="{FF2B5EF4-FFF2-40B4-BE49-F238E27FC236}">
-                <a16:creationId xmlns:a16="http://schemas.microsoft.com/office/drawing/2014/main" id="{ABC53672-EF4B-4831-9E38-12951B158619}"/>
-              </a:ext>
-            </a:extLst>
-          </p:cNvPr>
-          <p:cNvSpPr>
-            <a:spLocks noGrp="1"/>
-          </p:cNvSpPr>
-          <p:nvPr>
-            <p:ph type="title"/>
-          </p:nvPr>
-        </p:nvSpPr>
-        <p:spPr/>
-        <p:txBody>
-          <a:bodyPr/>
-          <a:lstStyle/>
-          <a:p>
-            <a:r>
-              <a:rPr lang="pl-PL" dirty="0"/>
-              <a:t>Przykład</a:t>
-            </a:r>
-          </a:p>
-        </p:txBody>
-      </p:sp>
-      <p:grpSp>
-        <p:nvGrpSpPr>
-          <p:cNvPr id="8" name="Grupa 7">
-            <a:extLst>
-              <a:ext uri="{FF2B5EF4-FFF2-40B4-BE49-F238E27FC236}">
-                <a16:creationId xmlns:a16="http://schemas.microsoft.com/office/drawing/2014/main" id="{91FDE43D-B8A5-4B93-9EE3-2ED73D1D903B}"/>
-              </a:ext>
-            </a:extLst>
-          </p:cNvPr>
-          <p:cNvGrpSpPr/>
-          <p:nvPr/>
-        </p:nvGrpSpPr>
-        <p:grpSpPr>
-          <a:xfrm>
-            <a:off x="0" y="1892182"/>
-            <a:ext cx="6316070" cy="3429922"/>
-            <a:chOff x="0" y="1892182"/>
-            <a:chExt cx="6316070" cy="3429922"/>
-          </a:xfrm>
-        </p:grpSpPr>
-        <p:graphicFrame>
-          <p:nvGraphicFramePr>
-            <p:cNvPr id="4" name="Diagram 3">
-              <a:extLst>
-                <a:ext uri="{FF2B5EF4-FFF2-40B4-BE49-F238E27FC236}">
-                  <a16:creationId xmlns:a16="http://schemas.microsoft.com/office/drawing/2014/main" id="{04D11AEF-FB9A-4BD3-ABC4-0314E8D30E30}"/>
-                </a:ext>
-              </a:extLst>
-            </p:cNvPr>
-            <p:cNvGraphicFramePr/>
-            <p:nvPr>
-              <p:extLst>
-                <p:ext uri="{D42A27DB-BD31-4B8C-83A1-F6EECF244321}">
-                  <p14:modId xmlns:p14="http://schemas.microsoft.com/office/powerpoint/2010/main" val="3161024841"/>
-                </p:ext>
-              </p:extLst>
-            </p:nvPr>
-          </p:nvGraphicFramePr>
-          <p:xfrm>
-            <a:off x="0" y="1892182"/>
-            <a:ext cx="6316070" cy="3429922"/>
-          </p:xfrm>
-          <a:graphic>
-            <a:graphicData uri="http://schemas.openxmlformats.org/drawingml/2006/diagram">
-              <dgm:relIds xmlns:dgm="http://schemas.openxmlformats.org/drawingml/2006/diagram" xmlns:r="http://schemas.openxmlformats.org/officeDocument/2006/relationships" r:dm="rId2" r:lo="rId3" r:qs="rId4" r:cs="rId5"/>
-            </a:graphicData>
-          </a:graphic>
-        </p:graphicFrame>
-        <p:pic>
-          <p:nvPicPr>
-            <p:cNvPr id="5" name="Obraz 4" descr="Obraz zawierający tekst, znak&#10;&#10;Opis wygenerowany przy wysokim poziomie pewności">
-              <a:extLst>
-                <a:ext uri="{FF2B5EF4-FFF2-40B4-BE49-F238E27FC236}">
-                  <a16:creationId xmlns:a16="http://schemas.microsoft.com/office/drawing/2014/main" id="{8475C1EA-C10C-46AC-B2ED-21E16000A1ED}"/>
-                </a:ext>
-              </a:extLst>
-            </p:cNvPr>
-            <p:cNvPicPr>
-              <a:picLocks noChangeAspect="1"/>
-            </p:cNvPicPr>
-            <p:nvPr/>
-          </p:nvPicPr>
-          <p:blipFill>
-            <a:blip r:embed="rId7">
-              <a:extLst>
-                <a:ext uri="{837473B0-CC2E-450A-ABE3-18F120FF3D39}">
-                  <a1611:picAttrSrcUrl xmlns:a1611="http://schemas.microsoft.com/office/drawing/2016/11/main" r:id="rId8"/>
-                </a:ext>
-              </a:extLst>
-            </a:blip>
-            <a:stretch>
-              <a:fillRect/>
-            </a:stretch>
-          </p:blipFill>
-          <p:spPr>
-            <a:xfrm>
-              <a:off x="1997397" y="3762595"/>
-              <a:ext cx="376272" cy="376272"/>
-            </a:xfrm>
-            <a:prstGeom prst="rect">
-              <a:avLst/>
-            </a:prstGeom>
-          </p:spPr>
-        </p:pic>
-        <p:pic>
-          <p:nvPicPr>
-            <p:cNvPr id="6" name="Obraz 5">
-              <a:extLst>
-                <a:ext uri="{FF2B5EF4-FFF2-40B4-BE49-F238E27FC236}">
-                  <a16:creationId xmlns:a16="http://schemas.microsoft.com/office/drawing/2014/main" id="{67DD1412-5BB4-413D-B915-E4F0F76688DC}"/>
-                </a:ext>
-              </a:extLst>
-            </p:cNvPr>
-            <p:cNvPicPr>
-              <a:picLocks noChangeAspect="1"/>
-            </p:cNvPicPr>
-            <p:nvPr/>
-          </p:nvPicPr>
-          <p:blipFill>
-            <a:blip r:embed="rId9">
-              <a:extLst>
-                <a:ext uri="{837473B0-CC2E-450A-ABE3-18F120FF3D39}">
-                  <a1611:picAttrSrcUrl xmlns:a1611="http://schemas.microsoft.com/office/drawing/2016/11/main" r:id="rId10"/>
-                </a:ext>
-              </a:extLst>
-            </a:blip>
-            <a:stretch>
-              <a:fillRect/>
-            </a:stretch>
-          </p:blipFill>
-          <p:spPr>
-            <a:xfrm>
-              <a:off x="1966412" y="4152225"/>
-              <a:ext cx="438242" cy="438242"/>
-            </a:xfrm>
-            <a:prstGeom prst="rect">
-              <a:avLst/>
-            </a:prstGeom>
-          </p:spPr>
-        </p:pic>
-        <p:pic>
-          <p:nvPicPr>
-            <p:cNvPr id="7" name="Obraz 6" descr="Obraz zawierający niebo, zewnętrzne&#10;&#10;Opis wygenerowany przy wysokim poziomie pewności">
-              <a:extLst>
-                <a:ext uri="{FF2B5EF4-FFF2-40B4-BE49-F238E27FC236}">
-                  <a16:creationId xmlns:a16="http://schemas.microsoft.com/office/drawing/2014/main" id="{B03B6076-4E2B-4170-9D2A-44DEB55DE0F1}"/>
-                </a:ext>
-              </a:extLst>
-            </p:cNvPr>
-            <p:cNvPicPr>
-              <a:picLocks noChangeAspect="1"/>
-            </p:cNvPicPr>
-            <p:nvPr/>
-          </p:nvPicPr>
-          <p:blipFill>
-            <a:blip r:embed="rId11"/>
-            <a:stretch>
-              <a:fillRect/>
-            </a:stretch>
-          </p:blipFill>
-          <p:spPr>
-            <a:xfrm>
-              <a:off x="1373795" y="4530286"/>
-              <a:ext cx="1685446" cy="666278"/>
-            </a:xfrm>
-            <a:prstGeom prst="rect">
-              <a:avLst/>
-            </a:prstGeom>
-          </p:spPr>
-        </p:pic>
-      </p:grpSp>
-      <p:grpSp>
-        <p:nvGrpSpPr>
-          <p:cNvPr id="19" name="Grupa 18">
-            <a:extLst>
-              <a:ext uri="{FF2B5EF4-FFF2-40B4-BE49-F238E27FC236}">
-                <a16:creationId xmlns:a16="http://schemas.microsoft.com/office/drawing/2014/main" id="{B86586E8-A692-40A3-AAA2-89430CF42645}"/>
-              </a:ext>
-            </a:extLst>
-          </p:cNvPr>
-          <p:cNvGrpSpPr/>
-          <p:nvPr/>
-        </p:nvGrpSpPr>
-        <p:grpSpPr>
-          <a:xfrm>
-            <a:off x="5739468" y="1892182"/>
-            <a:ext cx="6316070" cy="3429922"/>
-            <a:chOff x="0" y="1892182"/>
-            <a:chExt cx="6316070" cy="3429922"/>
-          </a:xfrm>
-        </p:grpSpPr>
-        <p:graphicFrame>
-          <p:nvGraphicFramePr>
-            <p:cNvPr id="20" name="Diagram 19">
-              <a:extLst>
-                <a:ext uri="{FF2B5EF4-FFF2-40B4-BE49-F238E27FC236}">
-                  <a16:creationId xmlns:a16="http://schemas.microsoft.com/office/drawing/2014/main" id="{8B4C87CF-B829-442E-8344-46F3882E34BD}"/>
-                </a:ext>
-              </a:extLst>
-            </p:cNvPr>
-            <p:cNvGraphicFramePr/>
-            <p:nvPr>
-              <p:extLst>
-                <p:ext uri="{D42A27DB-BD31-4B8C-83A1-F6EECF244321}">
-                  <p14:modId xmlns:p14="http://schemas.microsoft.com/office/powerpoint/2010/main" val="2826778112"/>
-                </p:ext>
-              </p:extLst>
-            </p:nvPr>
-          </p:nvGraphicFramePr>
-          <p:xfrm>
-            <a:off x="0" y="1892182"/>
-            <a:ext cx="6316070" cy="3429922"/>
-          </p:xfrm>
-          <a:graphic>
-            <a:graphicData uri="http://schemas.openxmlformats.org/drawingml/2006/diagram">
-              <dgm:relIds xmlns:dgm="http://schemas.openxmlformats.org/drawingml/2006/diagram" xmlns:r="http://schemas.openxmlformats.org/officeDocument/2006/relationships" r:dm="rId12" r:lo="rId13" r:qs="rId14" r:cs="rId15"/>
-            </a:graphicData>
-          </a:graphic>
-        </p:graphicFrame>
-        <p:pic>
-          <p:nvPicPr>
-            <p:cNvPr id="21" name="Obraz 20" descr="Obraz zawierający tekst, znak&#10;&#10;Opis wygenerowany przy wysokim poziomie pewności">
-              <a:extLst>
-                <a:ext uri="{FF2B5EF4-FFF2-40B4-BE49-F238E27FC236}">
-                  <a16:creationId xmlns:a16="http://schemas.microsoft.com/office/drawing/2014/main" id="{1800C2A6-D8A6-4293-8186-C6C34AE7354A}"/>
-                </a:ext>
-              </a:extLst>
-            </p:cNvPr>
-            <p:cNvPicPr>
-              <a:picLocks noChangeAspect="1"/>
-            </p:cNvPicPr>
-            <p:nvPr/>
-          </p:nvPicPr>
-          <p:blipFill>
-            <a:blip r:embed="rId7">
-              <a:extLst>
-                <a:ext uri="{837473B0-CC2E-450A-ABE3-18F120FF3D39}">
-                  <a1611:picAttrSrcUrl xmlns:a1611="http://schemas.microsoft.com/office/drawing/2016/11/main" r:id="rId8"/>
-                </a:ext>
-              </a:extLst>
-            </a:blip>
-            <a:stretch>
-              <a:fillRect/>
-            </a:stretch>
-          </p:blipFill>
-          <p:spPr>
-            <a:xfrm>
-              <a:off x="1932832" y="3762595"/>
-              <a:ext cx="376272" cy="376272"/>
-            </a:xfrm>
-            <a:prstGeom prst="rect">
-              <a:avLst/>
-            </a:prstGeom>
-          </p:spPr>
-        </p:pic>
-        <p:pic>
-          <p:nvPicPr>
-            <p:cNvPr id="22" name="Obraz 21">
-              <a:extLst>
-                <a:ext uri="{FF2B5EF4-FFF2-40B4-BE49-F238E27FC236}">
-                  <a16:creationId xmlns:a16="http://schemas.microsoft.com/office/drawing/2014/main" id="{593AD937-1EA8-41D0-B54E-A5DA7BFBFA0D}"/>
-                </a:ext>
-              </a:extLst>
-            </p:cNvPr>
-            <p:cNvPicPr>
-              <a:picLocks noChangeAspect="1"/>
-            </p:cNvPicPr>
-            <p:nvPr/>
-          </p:nvPicPr>
-          <p:blipFill>
-            <a:blip r:embed="rId9">
-              <a:extLst>
-                <a:ext uri="{837473B0-CC2E-450A-ABE3-18F120FF3D39}">
-                  <a1611:picAttrSrcUrl xmlns:a1611="http://schemas.microsoft.com/office/drawing/2016/11/main" r:id="rId10"/>
-                </a:ext>
-              </a:extLst>
-            </a:blip>
-            <a:stretch>
-              <a:fillRect/>
-            </a:stretch>
-          </p:blipFill>
-          <p:spPr>
-            <a:xfrm>
-              <a:off x="1895820" y="4152225"/>
-              <a:ext cx="438242" cy="438242"/>
-            </a:xfrm>
-            <a:prstGeom prst="rect">
-              <a:avLst/>
-            </a:prstGeom>
-          </p:spPr>
-        </p:pic>
-        <p:pic>
-          <p:nvPicPr>
-            <p:cNvPr id="23" name="Obraz 22" descr="Obraz zawierający niebo, zewnętrzne&#10;&#10;Opis wygenerowany przy wysokim poziomie pewności">
-              <a:extLst>
-                <a:ext uri="{FF2B5EF4-FFF2-40B4-BE49-F238E27FC236}">
-                  <a16:creationId xmlns:a16="http://schemas.microsoft.com/office/drawing/2014/main" id="{92167F14-F089-4F24-981A-2919931C0AEA}"/>
-                </a:ext>
-              </a:extLst>
-            </p:cNvPr>
-            <p:cNvPicPr>
-              <a:picLocks noChangeAspect="1"/>
-            </p:cNvPicPr>
-            <p:nvPr/>
-          </p:nvPicPr>
-          <p:blipFill>
-            <a:blip r:embed="rId11"/>
-            <a:stretch>
-              <a:fillRect/>
-            </a:stretch>
-          </p:blipFill>
-          <p:spPr>
-            <a:xfrm>
-              <a:off x="1278245" y="4530286"/>
-              <a:ext cx="1685446" cy="666278"/>
-            </a:xfrm>
-            <a:prstGeom prst="rect">
-              <a:avLst/>
-            </a:prstGeom>
-          </p:spPr>
-        </p:pic>
-      </p:grpSp>
-    </p:spTree>
-    <p:extLst>
-      <p:ext uri="{BB962C8B-B14F-4D97-AF65-F5344CB8AC3E}">
-        <p14:creationId xmlns:p14="http://schemas.microsoft.com/office/powerpoint/2010/main" val="2266060619"/>
-      </p:ext>
-    </p:extLst>
-  </p:cSld>
-  <p:clrMapOvr>
-    <a:masterClrMapping/>
-  </p:clrMapOvr>
-</p:sld>
-</file>
-
-<file path=ppt/slides/slide9.xml><?xml version="1.0" encoding="utf-8"?>
-<p:sld xmlns:a="http://schemas.openxmlformats.org/drawingml/2006/main" xmlns:r="http://schemas.openxmlformats.org/officeDocument/2006/relationships" xmlns:p="http://schemas.openxmlformats.org/presentationml/2006/main">
-  <p:cSld>
-    <p:spTree>
-      <p:nvGrpSpPr>
-        <p:cNvPr id="1" name=""/>
-        <p:cNvGrpSpPr/>
-        <p:nvPr/>
-      </p:nvGrpSpPr>
-      <p:grpSpPr>
-        <a:xfrm>
-          <a:off x="0" y="0"/>
-          <a:ext cx="0" cy="0"/>
-          <a:chOff x="0" y="0"/>
-          <a:chExt cx="0" cy="0"/>
-        </a:xfrm>
-      </p:grpSpPr>
-      <p:sp>
-        <p:nvSpPr>
-          <p:cNvPr id="2" name="Tytuł 1">
-            <a:extLst>
-              <a:ext uri="{FF2B5EF4-FFF2-40B4-BE49-F238E27FC236}">
-                <a16:creationId xmlns:a16="http://schemas.microsoft.com/office/drawing/2014/main" id="{ABC53672-EF4B-4831-9E38-12951B158619}"/>
-              </a:ext>
-            </a:extLst>
-          </p:cNvPr>
-          <p:cNvSpPr>
-            <a:spLocks noGrp="1"/>
-          </p:cNvSpPr>
-          <p:nvPr>
-            <p:ph type="title"/>
-          </p:nvPr>
-        </p:nvSpPr>
-        <p:spPr/>
-        <p:txBody>
-          <a:bodyPr/>
-          <a:lstStyle/>
-          <a:p>
-            <a:r>
-              <a:rPr lang="pl-PL" dirty="0"/>
-              <a:t>Przykład</a:t>
-            </a:r>
-          </a:p>
-        </p:txBody>
-      </p:sp>
-      <p:grpSp>
-        <p:nvGrpSpPr>
-          <p:cNvPr id="8" name="Grupa 7">
-            <a:extLst>
-              <a:ext uri="{FF2B5EF4-FFF2-40B4-BE49-F238E27FC236}">
-                <a16:creationId xmlns:a16="http://schemas.microsoft.com/office/drawing/2014/main" id="{91FDE43D-B8A5-4B93-9EE3-2ED73D1D903B}"/>
-              </a:ext>
-            </a:extLst>
-          </p:cNvPr>
-          <p:cNvGrpSpPr/>
-          <p:nvPr/>
-        </p:nvGrpSpPr>
-        <p:grpSpPr>
-          <a:xfrm>
-            <a:off x="0" y="1892182"/>
-            <a:ext cx="6316070" cy="3429922"/>
-            <a:chOff x="0" y="1892182"/>
-            <a:chExt cx="6316070" cy="3429922"/>
-          </a:xfrm>
-        </p:grpSpPr>
-        <p:graphicFrame>
-          <p:nvGraphicFramePr>
-            <p:cNvPr id="4" name="Diagram 3">
-              <a:extLst>
-                <a:ext uri="{FF2B5EF4-FFF2-40B4-BE49-F238E27FC236}">
-                  <a16:creationId xmlns:a16="http://schemas.microsoft.com/office/drawing/2014/main" id="{04D11AEF-FB9A-4BD3-ABC4-0314E8D30E30}"/>
-                </a:ext>
-              </a:extLst>
-            </p:cNvPr>
-            <p:cNvGraphicFramePr/>
-            <p:nvPr>
-              <p:extLst>
-                <p:ext uri="{D42A27DB-BD31-4B8C-83A1-F6EECF244321}">
-                  <p14:modId xmlns:p14="http://schemas.microsoft.com/office/powerpoint/2010/main" val="1530354962"/>
-                </p:ext>
-              </p:extLst>
-            </p:nvPr>
-          </p:nvGraphicFramePr>
-          <p:xfrm>
-            <a:off x="0" y="1892182"/>
-            <a:ext cx="6316070" cy="3429922"/>
-          </p:xfrm>
-          <a:graphic>
-            <a:graphicData uri="http://schemas.openxmlformats.org/drawingml/2006/diagram">
-              <dgm:relIds xmlns:dgm="http://schemas.openxmlformats.org/drawingml/2006/diagram" xmlns:r="http://schemas.openxmlformats.org/officeDocument/2006/relationships" r:dm="rId2" r:lo="rId3" r:qs="rId4" r:cs="rId5"/>
-            </a:graphicData>
-          </a:graphic>
-        </p:graphicFrame>
-        <p:pic>
-          <p:nvPicPr>
-            <p:cNvPr id="5" name="Obraz 4" descr="Obraz zawierający tekst, znak&#10;&#10;Opis wygenerowany przy wysokim poziomie pewności">
-              <a:extLst>
-                <a:ext uri="{FF2B5EF4-FFF2-40B4-BE49-F238E27FC236}">
-                  <a16:creationId xmlns:a16="http://schemas.microsoft.com/office/drawing/2014/main" id="{8475C1EA-C10C-46AC-B2ED-21E16000A1ED}"/>
-                </a:ext>
-              </a:extLst>
-            </p:cNvPr>
-            <p:cNvPicPr>
-              <a:picLocks noChangeAspect="1"/>
-            </p:cNvPicPr>
-            <p:nvPr/>
-          </p:nvPicPr>
-          <p:blipFill>
-            <a:blip r:embed="rId7">
-              <a:extLst>
-                <a:ext uri="{837473B0-CC2E-450A-ABE3-18F120FF3D39}">
-                  <a1611:picAttrSrcUrl xmlns:a1611="http://schemas.microsoft.com/office/drawing/2016/11/main" r:id="rId8"/>
-                </a:ext>
-              </a:extLst>
-            </a:blip>
-            <a:stretch>
-              <a:fillRect/>
-            </a:stretch>
-          </p:blipFill>
-          <p:spPr>
-            <a:xfrm>
-              <a:off x="1997397" y="3762595"/>
-              <a:ext cx="376272" cy="376272"/>
-            </a:xfrm>
-            <a:prstGeom prst="rect">
-              <a:avLst/>
-            </a:prstGeom>
-          </p:spPr>
-        </p:pic>
-        <p:pic>
-          <p:nvPicPr>
-            <p:cNvPr id="6" name="Obraz 5">
-              <a:extLst>
-                <a:ext uri="{FF2B5EF4-FFF2-40B4-BE49-F238E27FC236}">
-                  <a16:creationId xmlns:a16="http://schemas.microsoft.com/office/drawing/2014/main" id="{67DD1412-5BB4-413D-B915-E4F0F76688DC}"/>
-                </a:ext>
-              </a:extLst>
-            </p:cNvPr>
-            <p:cNvPicPr>
-              <a:picLocks noChangeAspect="1"/>
-            </p:cNvPicPr>
-            <p:nvPr/>
-          </p:nvPicPr>
-          <p:blipFill>
-            <a:blip r:embed="rId9">
-              <a:extLst>
-                <a:ext uri="{837473B0-CC2E-450A-ABE3-18F120FF3D39}">
-                  <a1611:picAttrSrcUrl xmlns:a1611="http://schemas.microsoft.com/office/drawing/2016/11/main" r:id="rId10"/>
-                </a:ext>
-              </a:extLst>
-            </a:blip>
-            <a:stretch>
-              <a:fillRect/>
-            </a:stretch>
-          </p:blipFill>
-          <p:spPr>
-            <a:xfrm>
-              <a:off x="1966412" y="4152225"/>
-              <a:ext cx="438242" cy="438242"/>
-            </a:xfrm>
-            <a:prstGeom prst="rect">
-              <a:avLst/>
-            </a:prstGeom>
-          </p:spPr>
-        </p:pic>
-        <p:pic>
-          <p:nvPicPr>
-            <p:cNvPr id="7" name="Obraz 6" descr="Obraz zawierający niebo, zewnętrzne&#10;&#10;Opis wygenerowany przy wysokim poziomie pewności">
-              <a:extLst>
-                <a:ext uri="{FF2B5EF4-FFF2-40B4-BE49-F238E27FC236}">
-                  <a16:creationId xmlns:a16="http://schemas.microsoft.com/office/drawing/2014/main" id="{B03B6076-4E2B-4170-9D2A-44DEB55DE0F1}"/>
-                </a:ext>
-              </a:extLst>
-            </p:cNvPr>
-            <p:cNvPicPr>
-              <a:picLocks noChangeAspect="1"/>
-            </p:cNvPicPr>
-            <p:nvPr/>
-          </p:nvPicPr>
-          <p:blipFill>
-            <a:blip r:embed="rId11"/>
-            <a:stretch>
-              <a:fillRect/>
-            </a:stretch>
-          </p:blipFill>
-          <p:spPr>
-            <a:xfrm>
-              <a:off x="1373795" y="4530286"/>
-              <a:ext cx="1685446" cy="666278"/>
-            </a:xfrm>
-            <a:prstGeom prst="rect">
-              <a:avLst/>
-            </a:prstGeom>
-          </p:spPr>
-        </p:pic>
-      </p:grpSp>
-      <p:grpSp>
-        <p:nvGrpSpPr>
-          <p:cNvPr id="19" name="Grupa 18">
-            <a:extLst>
-              <a:ext uri="{FF2B5EF4-FFF2-40B4-BE49-F238E27FC236}">
-                <a16:creationId xmlns:a16="http://schemas.microsoft.com/office/drawing/2014/main" id="{B86586E8-A692-40A3-AAA2-89430CF42645}"/>
-              </a:ext>
-            </a:extLst>
-          </p:cNvPr>
-          <p:cNvGrpSpPr/>
-          <p:nvPr/>
-        </p:nvGrpSpPr>
-        <p:grpSpPr>
-          <a:xfrm>
-            <a:off x="5739468" y="1892182"/>
-            <a:ext cx="6316070" cy="3429922"/>
-            <a:chOff x="0" y="1892182"/>
-            <a:chExt cx="6316070" cy="3429922"/>
-          </a:xfrm>
-        </p:grpSpPr>
-        <p:graphicFrame>
-          <p:nvGraphicFramePr>
-            <p:cNvPr id="20" name="Diagram 19">
-              <a:extLst>
-                <a:ext uri="{FF2B5EF4-FFF2-40B4-BE49-F238E27FC236}">
-                  <a16:creationId xmlns:a16="http://schemas.microsoft.com/office/drawing/2014/main" id="{8B4C87CF-B829-442E-8344-46F3882E34BD}"/>
-                </a:ext>
-              </a:extLst>
-            </p:cNvPr>
-            <p:cNvGraphicFramePr/>
-            <p:nvPr>
-              <p:extLst>
-                <p:ext uri="{D42A27DB-BD31-4B8C-83A1-F6EECF244321}">
-                  <p14:modId xmlns:p14="http://schemas.microsoft.com/office/powerpoint/2010/main" val="289921194"/>
-                </p:ext>
-              </p:extLst>
-            </p:nvPr>
-          </p:nvGraphicFramePr>
-          <p:xfrm>
-            <a:off x="0" y="1892182"/>
-            <a:ext cx="6316070" cy="3429922"/>
-          </p:xfrm>
-          <a:graphic>
-            <a:graphicData uri="http://schemas.openxmlformats.org/drawingml/2006/diagram">
-              <dgm:relIds xmlns:dgm="http://schemas.openxmlformats.org/drawingml/2006/diagram" xmlns:r="http://schemas.openxmlformats.org/officeDocument/2006/relationships" r:dm="rId12" r:lo="rId13" r:qs="rId14" r:cs="rId15"/>
-            </a:graphicData>
-          </a:graphic>
-        </p:graphicFrame>
-        <p:pic>
-          <p:nvPicPr>
-            <p:cNvPr id="21" name="Obraz 20" descr="Obraz zawierający tekst, znak&#10;&#10;Opis wygenerowany przy wysokim poziomie pewności">
-              <a:extLst>
-                <a:ext uri="{FF2B5EF4-FFF2-40B4-BE49-F238E27FC236}">
-                  <a16:creationId xmlns:a16="http://schemas.microsoft.com/office/drawing/2014/main" id="{1800C2A6-D8A6-4293-8186-C6C34AE7354A}"/>
-                </a:ext>
-              </a:extLst>
-            </p:cNvPr>
-            <p:cNvPicPr>
-              <a:picLocks noChangeAspect="1"/>
-            </p:cNvPicPr>
-            <p:nvPr/>
-          </p:nvPicPr>
-          <p:blipFill>
-            <a:blip r:embed="rId7">
-              <a:extLst>
-                <a:ext uri="{837473B0-CC2E-450A-ABE3-18F120FF3D39}">
-                  <a1611:picAttrSrcUrl xmlns:a1611="http://schemas.microsoft.com/office/drawing/2016/11/main" r:id="rId8"/>
-                </a:ext>
-              </a:extLst>
-            </a:blip>
-            <a:stretch>
-              <a:fillRect/>
-            </a:stretch>
-          </p:blipFill>
-          <p:spPr>
-            <a:xfrm>
-              <a:off x="1932832" y="3762595"/>
-              <a:ext cx="376272" cy="376272"/>
-            </a:xfrm>
-            <a:prstGeom prst="rect">
-              <a:avLst/>
-            </a:prstGeom>
-          </p:spPr>
-        </p:pic>
-        <p:pic>
-          <p:nvPicPr>
-            <p:cNvPr id="22" name="Obraz 21">
-              <a:extLst>
-                <a:ext uri="{FF2B5EF4-FFF2-40B4-BE49-F238E27FC236}">
-                  <a16:creationId xmlns:a16="http://schemas.microsoft.com/office/drawing/2014/main" id="{593AD937-1EA8-41D0-B54E-A5DA7BFBFA0D}"/>
-                </a:ext>
-              </a:extLst>
-            </p:cNvPr>
-            <p:cNvPicPr>
-              <a:picLocks noChangeAspect="1"/>
-            </p:cNvPicPr>
-            <p:nvPr/>
-          </p:nvPicPr>
-          <p:blipFill>
-            <a:blip r:embed="rId9">
-              <a:extLst>
-                <a:ext uri="{837473B0-CC2E-450A-ABE3-18F120FF3D39}">
-                  <a1611:picAttrSrcUrl xmlns:a1611="http://schemas.microsoft.com/office/drawing/2016/11/main" r:id="rId10"/>
-                </a:ext>
-              </a:extLst>
-            </a:blip>
-            <a:stretch>
-              <a:fillRect/>
-            </a:stretch>
-          </p:blipFill>
-          <p:spPr>
-            <a:xfrm>
-              <a:off x="1895820" y="4152225"/>
-              <a:ext cx="438242" cy="438242"/>
-            </a:xfrm>
-            <a:prstGeom prst="rect">
-              <a:avLst/>
-            </a:prstGeom>
-          </p:spPr>
-        </p:pic>
-        <p:pic>
-          <p:nvPicPr>
-            <p:cNvPr id="23" name="Obraz 22" descr="Obraz zawierający niebo, zewnętrzne&#10;&#10;Opis wygenerowany przy wysokim poziomie pewności">
-              <a:extLst>
-                <a:ext uri="{FF2B5EF4-FFF2-40B4-BE49-F238E27FC236}">
-                  <a16:creationId xmlns:a16="http://schemas.microsoft.com/office/drawing/2014/main" id="{92167F14-F089-4F24-981A-2919931C0AEA}"/>
-                </a:ext>
-              </a:extLst>
-            </p:cNvPr>
-            <p:cNvPicPr>
-              <a:picLocks noChangeAspect="1"/>
-            </p:cNvPicPr>
-            <p:nvPr/>
-          </p:nvPicPr>
-          <p:blipFill>
-            <a:blip r:embed="rId11"/>
-            <a:stretch>
-              <a:fillRect/>
-            </a:stretch>
-          </p:blipFill>
-          <p:spPr>
-            <a:xfrm>
-              <a:off x="1278245" y="4530286"/>
-              <a:ext cx="1685446" cy="666278"/>
-            </a:xfrm>
-            <a:prstGeom prst="rect">
-              <a:avLst/>
-            </a:prstGeom>
-          </p:spPr>
-        </p:pic>
-      </p:grpSp>
-    </p:spTree>
-    <p:extLst>
-      <p:ext uri="{BB962C8B-B14F-4D97-AF65-F5344CB8AC3E}">
-        <p14:creationId xmlns:p14="http://schemas.microsoft.com/office/powerpoint/2010/main" val="2851606754"/>
       </p:ext>
     </p:extLst>
   </p:cSld>

</xml_diff>